<commit_message>
update stage 4 index titles
</commit_message>
<xml_diff>
--- a/reflections-on-trusting-trust-slides.pptx
+++ b/reflections-on-trusting-trust-slides.pptx
@@ -237,7 +237,7 @@
           <a:p>
             <a:fld id="{DBB36151-A010-D04C-8956-928746249808}" type="datetimeFigureOut">
               <a:rPr lang="en-US" smtClean="0"/>
-              <a:t>1/24/2016</a:t>
+              <a:t>1/25/16</a:t>
             </a:fld>
             <a:endParaRPr lang="en-US"/>
           </a:p>
@@ -402,7 +402,7 @@
           <a:p>
             <a:fld id="{A4C7C88C-CDFE-4350-B2C5-3C6CAEFDB07C}" type="datetimeFigureOut">
               <a:rPr lang="en-SG" smtClean="0"/>
-              <a:t>24/1/2016</a:t>
+              <a:t>25/1/16</a:t>
             </a:fld>
             <a:endParaRPr lang="en-SG"/>
           </a:p>
@@ -801,7 +801,7 @@
           <a:p>
             <a:fld id="{422F67E2-38E7-4A1D-97B7-1A3D76F52D34}" type="datetime1">
               <a:rPr lang="en-SG" smtClean="0"/>
-              <a:t>24/1/2016</a:t>
+              <a:t>25/1/16</a:t>
             </a:fld>
             <a:endParaRPr lang="en-SG"/>
           </a:p>
@@ -971,7 +971,7 @@
           <a:p>
             <a:fld id="{571D26BE-CF29-49E8-90A9-693FA176DA2E}" type="datetime1">
               <a:rPr lang="en-SG" smtClean="0"/>
-              <a:t>24/1/2016</a:t>
+              <a:t>25/1/16</a:t>
             </a:fld>
             <a:endParaRPr lang="en-SG"/>
           </a:p>
@@ -1151,7 +1151,7 @@
           <a:p>
             <a:fld id="{9465F57D-487B-4FA9-9804-4E6B1445D87E}" type="datetime1">
               <a:rPr lang="en-SG" smtClean="0"/>
-              <a:t>24/1/2016</a:t>
+              <a:t>25/1/16</a:t>
             </a:fld>
             <a:endParaRPr lang="en-SG"/>
           </a:p>
@@ -1321,7 +1321,7 @@
           <a:p>
             <a:fld id="{FF100F33-09D9-4424-9CFF-3583AE8E001C}" type="datetime1">
               <a:rPr lang="en-SG" smtClean="0"/>
-              <a:t>24/1/2016</a:t>
+              <a:t>25/1/16</a:t>
             </a:fld>
             <a:endParaRPr lang="en-SG"/>
           </a:p>
@@ -1565,7 +1565,7 @@
           <a:p>
             <a:fld id="{FEDF4C57-AE9B-4009-AE25-E54332066983}" type="datetime1">
               <a:rPr lang="en-SG" smtClean="0"/>
-              <a:t>24/1/2016</a:t>
+              <a:t>25/1/16</a:t>
             </a:fld>
             <a:endParaRPr lang="en-SG"/>
           </a:p>
@@ -1797,7 +1797,7 @@
           <a:p>
             <a:fld id="{8804DBDF-77D8-4526-82F0-2FD9258F6F4E}" type="datetime1">
               <a:rPr lang="en-SG" smtClean="0"/>
-              <a:t>24/1/2016</a:t>
+              <a:t>25/1/16</a:t>
             </a:fld>
             <a:endParaRPr lang="en-SG"/>
           </a:p>
@@ -2164,7 +2164,7 @@
           <a:p>
             <a:fld id="{2EDDACF3-1137-43EC-8B9B-FFC39405A05F}" type="datetime1">
               <a:rPr lang="en-SG" smtClean="0"/>
-              <a:t>24/1/2016</a:t>
+              <a:t>25/1/16</a:t>
             </a:fld>
             <a:endParaRPr lang="en-SG"/>
           </a:p>
@@ -2282,7 +2282,7 @@
           <a:p>
             <a:fld id="{7EA35B8A-1AE7-4E07-AA62-B18CC233816A}" type="datetime1">
               <a:rPr lang="en-SG" smtClean="0"/>
-              <a:t>24/1/2016</a:t>
+              <a:t>25/1/16</a:t>
             </a:fld>
             <a:endParaRPr lang="en-SG"/>
           </a:p>
@@ -2377,7 +2377,7 @@
           <a:p>
             <a:fld id="{3E5DB0B1-4D46-4B8D-87D9-ED3A0D6268D9}" type="datetime1">
               <a:rPr lang="en-SG" smtClean="0"/>
-              <a:t>24/1/2016</a:t>
+              <a:t>25/1/16</a:t>
             </a:fld>
             <a:endParaRPr lang="en-SG"/>
           </a:p>
@@ -2654,7 +2654,7 @@
           <a:p>
             <a:fld id="{B5FAF827-52F0-4265-95B3-9B7BE33238A1}" type="datetime1">
               <a:rPr lang="en-SG" smtClean="0"/>
-              <a:t>24/1/2016</a:t>
+              <a:t>25/1/16</a:t>
             </a:fld>
             <a:endParaRPr lang="en-SG"/>
           </a:p>
@@ -2911,7 +2911,7 @@
           <a:p>
             <a:fld id="{FB910920-7330-4500-8EED-E7F9B59504DB}" type="datetime1">
               <a:rPr lang="en-SG" smtClean="0"/>
-              <a:t>24/1/2016</a:t>
+              <a:t>25/1/16</a:t>
             </a:fld>
             <a:endParaRPr lang="en-SG"/>
           </a:p>
@@ -3124,7 +3124,7 @@
           <a:p>
             <a:fld id="{049282E9-B576-43F6-B614-0FB8874DC925}" type="datetime1">
               <a:rPr lang="en-SG" smtClean="0"/>
-              <a:t>24/1/2016</a:t>
+              <a:t>25/1/16</a:t>
             </a:fld>
             <a:endParaRPr lang="en-SG"/>
           </a:p>
@@ -4128,14 +4128,14 @@
                 <a:gridCol w="3744686">
                   <a:extLst>
                     <a:ext uri="{9D8B030D-6E8A-4147-A177-3AD203B41FA5}">
-                      <a16:colId xmlns:a16="http://schemas.microsoft.com/office/drawing/2014/main" val="20000"/>
+                      <a16:colId xmlns:a16="http://schemas.microsoft.com/office/drawing/2014/main" xmlns="" val="20000"/>
                     </a:ext>
                   </a:extLst>
                 </a:gridCol>
                 <a:gridCol w="3744686">
                   <a:extLst>
                     <a:ext uri="{9D8B030D-6E8A-4147-A177-3AD203B41FA5}">
-                      <a16:colId xmlns:a16="http://schemas.microsoft.com/office/drawing/2014/main" val="20001"/>
+                      <a16:colId xmlns:a16="http://schemas.microsoft.com/office/drawing/2014/main" xmlns="" val="20001"/>
                     </a:ext>
                   </a:extLst>
                 </a:gridCol>
@@ -4171,7 +4171,7 @@
                 </a:tc>
                 <a:extLst>
                   <a:ext uri="{0D108BD9-81ED-4DB2-BD59-A6C34878D82A}">
-                    <a16:rowId xmlns:a16="http://schemas.microsoft.com/office/drawing/2014/main" val="10000"/>
+                    <a16:rowId xmlns:a16="http://schemas.microsoft.com/office/drawing/2014/main" xmlns="" val="10000"/>
                   </a:ext>
                 </a:extLst>
               </a:tr>
@@ -4210,7 +4210,7 @@
                 </a:tc>
                 <a:extLst>
                   <a:ext uri="{0D108BD9-81ED-4DB2-BD59-A6C34878D82A}">
-                    <a16:rowId xmlns:a16="http://schemas.microsoft.com/office/drawing/2014/main" val="10001"/>
+                    <a16:rowId xmlns:a16="http://schemas.microsoft.com/office/drawing/2014/main" xmlns="" val="10001"/>
                   </a:ext>
                 </a:extLst>
               </a:tr>
@@ -4265,7 +4265,7 @@
                 </a:tc>
                 <a:extLst>
                   <a:ext uri="{0D108BD9-81ED-4DB2-BD59-A6C34878D82A}">
-                    <a16:rowId xmlns:a16="http://schemas.microsoft.com/office/drawing/2014/main" val="10002"/>
+                    <a16:rowId xmlns:a16="http://schemas.microsoft.com/office/drawing/2014/main" xmlns="" val="10002"/>
                   </a:ext>
                 </a:extLst>
               </a:tr>
@@ -4304,7 +4304,7 @@
                 </a:tc>
                 <a:extLst>
                   <a:ext uri="{0D108BD9-81ED-4DB2-BD59-A6C34878D82A}">
-                    <a16:rowId xmlns:a16="http://schemas.microsoft.com/office/drawing/2014/main" val="10003"/>
+                    <a16:rowId xmlns:a16="http://schemas.microsoft.com/office/drawing/2014/main" xmlns="" val="10003"/>
                   </a:ext>
                 </a:extLst>
               </a:tr>
@@ -4363,7 +4363,7 @@
                 </a:tc>
                 <a:extLst>
                   <a:ext uri="{0D108BD9-81ED-4DB2-BD59-A6C34878D82A}">
-                    <a16:rowId xmlns:a16="http://schemas.microsoft.com/office/drawing/2014/main" val="10004"/>
+                    <a16:rowId xmlns:a16="http://schemas.microsoft.com/office/drawing/2014/main" xmlns="" val="10004"/>
                   </a:ext>
                 </a:extLst>
               </a:tr>
@@ -4427,7 +4427,7 @@
                 </a:tc>
                 <a:extLst>
                   <a:ext uri="{0D108BD9-81ED-4DB2-BD59-A6C34878D82A}">
-                    <a16:rowId xmlns:a16="http://schemas.microsoft.com/office/drawing/2014/main" val="10005"/>
+                    <a16:rowId xmlns:a16="http://schemas.microsoft.com/office/drawing/2014/main" xmlns="" val="10005"/>
                   </a:ext>
                 </a:extLst>
               </a:tr>
@@ -10250,7 +10250,11 @@
           <a:p>
             <a:r>
               <a:rPr lang="en-US" dirty="0" smtClean="0"/>
-              <a:t>4c. mysha256.c</a:t>
+              <a:t>4b. </a:t>
+            </a:r>
+            <a:r>
+              <a:rPr lang="en-US" dirty="0" smtClean="0"/>
+              <a:t>mysha256.c</a:t>
             </a:r>
             <a:endParaRPr lang="en-US" dirty="0"/>
           </a:p>
@@ -10525,7 +10529,11 @@
           <a:p>
             <a:r>
               <a:rPr lang="en-US" dirty="0" smtClean="0"/>
-              <a:t>4d. mysha256-hacked.c</a:t>
+              <a:t>4c. </a:t>
+            </a:r>
+            <a:r>
+              <a:rPr lang="en-US" dirty="0" smtClean="0"/>
+              <a:t>mysha256-hacked.c</a:t>
             </a:r>
             <a:endParaRPr lang="en-US" dirty="0"/>
           </a:p>
@@ -10806,7 +10814,11 @@
           <a:p>
             <a:r>
               <a:rPr lang="en-US" dirty="0" smtClean="0"/>
-              <a:t>4e. compiler-hack-</a:t>
+              <a:t>4d. </a:t>
+            </a:r>
+            <a:r>
+              <a:rPr lang="en-US" dirty="0" smtClean="0"/>
+              <a:t>compiler-hack-</a:t>
             </a:r>
             <a:r>
               <a:rPr lang="en-US" dirty="0" err="1" smtClean="0"/>
@@ -21165,14 +21177,14 @@
                 <a:gridCol w="3048000">
                   <a:extLst>
                     <a:ext uri="{9D8B030D-6E8A-4147-A177-3AD203B41FA5}">
-                      <a16:colId xmlns:a16="http://schemas.microsoft.com/office/drawing/2014/main" val="20000"/>
+                      <a16:colId xmlns:a16="http://schemas.microsoft.com/office/drawing/2014/main" xmlns="" val="20000"/>
                     </a:ext>
                   </a:extLst>
                 </a:gridCol>
                 <a:gridCol w="3048000">
                   <a:extLst>
                     <a:ext uri="{9D8B030D-6E8A-4147-A177-3AD203B41FA5}">
-                      <a16:colId xmlns:a16="http://schemas.microsoft.com/office/drawing/2014/main" val="20001"/>
+                      <a16:colId xmlns:a16="http://schemas.microsoft.com/office/drawing/2014/main" xmlns="" val="20001"/>
                     </a:ext>
                   </a:extLst>
                 </a:gridCol>
@@ -21208,7 +21220,7 @@
                 </a:tc>
                 <a:extLst>
                   <a:ext uri="{0D108BD9-81ED-4DB2-BD59-A6C34878D82A}">
-                    <a16:rowId xmlns:a16="http://schemas.microsoft.com/office/drawing/2014/main" val="10000"/>
+                    <a16:rowId xmlns:a16="http://schemas.microsoft.com/office/drawing/2014/main" xmlns="" val="10000"/>
                   </a:ext>
                 </a:extLst>
               </a:tr>
@@ -21276,7 +21288,7 @@
                 </a:tc>
                 <a:extLst>
                   <a:ext uri="{0D108BD9-81ED-4DB2-BD59-A6C34878D82A}">
-                    <a16:rowId xmlns:a16="http://schemas.microsoft.com/office/drawing/2014/main" val="10001"/>
+                    <a16:rowId xmlns:a16="http://schemas.microsoft.com/office/drawing/2014/main" xmlns="" val="10001"/>
                   </a:ext>
                 </a:extLst>
               </a:tr>
@@ -21315,7 +21327,7 @@
                 </a:tc>
                 <a:extLst>
                   <a:ext uri="{0D108BD9-81ED-4DB2-BD59-A6C34878D82A}">
-                    <a16:rowId xmlns:a16="http://schemas.microsoft.com/office/drawing/2014/main" val="10002"/>
+                    <a16:rowId xmlns:a16="http://schemas.microsoft.com/office/drawing/2014/main" xmlns="" val="10002"/>
                   </a:ext>
                 </a:extLst>
               </a:tr>
@@ -21387,7 +21399,7 @@
                 </a:tc>
                 <a:extLst>
                   <a:ext uri="{0D108BD9-81ED-4DB2-BD59-A6C34878D82A}">
-                    <a16:rowId xmlns:a16="http://schemas.microsoft.com/office/drawing/2014/main" val="10003"/>
+                    <a16:rowId xmlns:a16="http://schemas.microsoft.com/office/drawing/2014/main" xmlns="" val="10003"/>
                   </a:ext>
                 </a:extLst>
               </a:tr>
@@ -21443,7 +21455,7 @@
                 </a:tc>
                 <a:extLst>
                   <a:ext uri="{0D108BD9-81ED-4DB2-BD59-A6C34878D82A}">
-                    <a16:rowId xmlns:a16="http://schemas.microsoft.com/office/drawing/2014/main" val="10004"/>
+                    <a16:rowId xmlns:a16="http://schemas.microsoft.com/office/drawing/2014/main" xmlns="" val="10004"/>
                   </a:ext>
                 </a:extLst>
               </a:tr>
@@ -21507,7 +21519,7 @@
                 </a:tc>
                 <a:extLst>
                   <a:ext uri="{0D108BD9-81ED-4DB2-BD59-A6C34878D82A}">
-                    <a16:rowId xmlns:a16="http://schemas.microsoft.com/office/drawing/2014/main" val="10005"/>
+                    <a16:rowId xmlns:a16="http://schemas.microsoft.com/office/drawing/2014/main" xmlns="" val="10005"/>
                   </a:ext>
                 </a:extLst>
               </a:tr>

</xml_diff>

<commit_message>
update slides and readme of new changes
</commit_message>
<xml_diff>
--- a/reflections-on-trusting-trust-slides.pptx
+++ b/reflections-on-trusting-trust-slides.pptx
@@ -238,7 +238,7 @@
           <a:p>
             <a:fld id="{DBB36151-A010-D04C-8956-928746249808}" type="datetimeFigureOut">
               <a:rPr lang="en-US" smtClean="0"/>
-              <a:t>3/5/2016</a:t>
+              <a:t>3/3/17</a:t>
             </a:fld>
             <a:endParaRPr lang="en-US"/>
           </a:p>
@@ -403,7 +403,7 @@
           <a:p>
             <a:fld id="{A4C7C88C-CDFE-4350-B2C5-3C6CAEFDB07C}" type="datetimeFigureOut">
               <a:rPr lang="en-SG" smtClean="0"/>
-              <a:t>5/3/2016</a:t>
+              <a:t>3/3/17</a:t>
             </a:fld>
             <a:endParaRPr lang="en-SG"/>
           </a:p>
@@ -671,6 +671,174 @@
 </p:notesMaster>
 </file>
 
+<file path=ppt/notesSlides/notesSlide1.xml><?xml version="1.0" encoding="utf-8"?>
+<p:notes xmlns:a="http://schemas.openxmlformats.org/drawingml/2006/main" xmlns:r="http://schemas.openxmlformats.org/officeDocument/2006/relationships" xmlns:p="http://schemas.openxmlformats.org/presentationml/2006/main">
+  <p:cSld>
+    <p:spTree>
+      <p:nvGrpSpPr>
+        <p:cNvPr id="1" name=""/>
+        <p:cNvGrpSpPr/>
+        <p:nvPr/>
+      </p:nvGrpSpPr>
+      <p:grpSpPr>
+        <a:xfrm>
+          <a:off x="0" y="0"/>
+          <a:ext cx="0" cy="0"/>
+          <a:chOff x="0" y="0"/>
+          <a:chExt cx="0" cy="0"/>
+        </a:xfrm>
+      </p:grpSpPr>
+      <p:sp>
+        <p:nvSpPr>
+          <p:cNvPr id="2" name="Slide Image Placeholder 1"/>
+          <p:cNvSpPr>
+            <a:spLocks noGrp="1" noRot="1" noChangeAspect="1"/>
+          </p:cNvSpPr>
+          <p:nvPr>
+            <p:ph type="sldImg"/>
+          </p:nvPr>
+        </p:nvSpPr>
+        <p:spPr/>
+      </p:sp>
+      <p:sp>
+        <p:nvSpPr>
+          <p:cNvPr id="3" name="Notes Placeholder 2"/>
+          <p:cNvSpPr>
+            <a:spLocks noGrp="1"/>
+          </p:cNvSpPr>
+          <p:nvPr>
+            <p:ph type="body" idx="1"/>
+          </p:nvPr>
+        </p:nvSpPr>
+        <p:spPr/>
+        <p:txBody>
+          <a:bodyPr/>
+          <a:lstStyle/>
+          <a:p>
+            <a:endParaRPr lang="en-US" dirty="0"/>
+          </a:p>
+        </p:txBody>
+      </p:sp>
+      <p:sp>
+        <p:nvSpPr>
+          <p:cNvPr id="4" name="Slide Number Placeholder 3"/>
+          <p:cNvSpPr>
+            <a:spLocks noGrp="1"/>
+          </p:cNvSpPr>
+          <p:nvPr>
+            <p:ph type="sldNum" sz="quarter" idx="10"/>
+          </p:nvPr>
+        </p:nvSpPr>
+        <p:spPr/>
+        <p:txBody>
+          <a:bodyPr/>
+          <a:lstStyle/>
+          <a:p>
+            <a:fld id="{1B99F681-B4F0-403D-8E4F-41A314F04FC9}" type="slidenum">
+              <a:rPr lang="en-SG" smtClean="0"/>
+              <a:t>22</a:t>
+            </a:fld>
+            <a:endParaRPr lang="en-SG"/>
+          </a:p>
+        </p:txBody>
+      </p:sp>
+    </p:spTree>
+    <p:extLst>
+      <p:ext uri="{BB962C8B-B14F-4D97-AF65-F5344CB8AC3E}">
+        <p14:creationId xmlns:p14="http://schemas.microsoft.com/office/powerpoint/2010/main" val="1317213315"/>
+      </p:ext>
+    </p:extLst>
+  </p:cSld>
+  <p:clrMapOvr>
+    <a:masterClrMapping/>
+  </p:clrMapOvr>
+</p:notes>
+</file>
+
+<file path=ppt/notesSlides/notesSlide2.xml><?xml version="1.0" encoding="utf-8"?>
+<p:notes xmlns:a="http://schemas.openxmlformats.org/drawingml/2006/main" xmlns:r="http://schemas.openxmlformats.org/officeDocument/2006/relationships" xmlns:p="http://schemas.openxmlformats.org/presentationml/2006/main">
+  <p:cSld>
+    <p:spTree>
+      <p:nvGrpSpPr>
+        <p:cNvPr id="1" name=""/>
+        <p:cNvGrpSpPr/>
+        <p:nvPr/>
+      </p:nvGrpSpPr>
+      <p:grpSpPr>
+        <a:xfrm>
+          <a:off x="0" y="0"/>
+          <a:ext cx="0" cy="0"/>
+          <a:chOff x="0" y="0"/>
+          <a:chExt cx="0" cy="0"/>
+        </a:xfrm>
+      </p:grpSpPr>
+      <p:sp>
+        <p:nvSpPr>
+          <p:cNvPr id="2" name="Slide Image Placeholder 1"/>
+          <p:cNvSpPr>
+            <a:spLocks noGrp="1" noRot="1" noChangeAspect="1"/>
+          </p:cNvSpPr>
+          <p:nvPr>
+            <p:ph type="sldImg"/>
+          </p:nvPr>
+        </p:nvSpPr>
+        <p:spPr/>
+      </p:sp>
+      <p:sp>
+        <p:nvSpPr>
+          <p:cNvPr id="3" name="Notes Placeholder 2"/>
+          <p:cNvSpPr>
+            <a:spLocks noGrp="1"/>
+          </p:cNvSpPr>
+          <p:nvPr>
+            <p:ph type="body" idx="1"/>
+          </p:nvPr>
+        </p:nvSpPr>
+        <p:spPr/>
+        <p:txBody>
+          <a:bodyPr/>
+          <a:lstStyle/>
+          <a:p>
+            <a:endParaRPr lang="en-US" dirty="0"/>
+          </a:p>
+        </p:txBody>
+      </p:sp>
+      <p:sp>
+        <p:nvSpPr>
+          <p:cNvPr id="4" name="Slide Number Placeholder 3"/>
+          <p:cNvSpPr>
+            <a:spLocks noGrp="1"/>
+          </p:cNvSpPr>
+          <p:nvPr>
+            <p:ph type="sldNum" sz="quarter" idx="10"/>
+          </p:nvPr>
+        </p:nvSpPr>
+        <p:spPr/>
+        <p:txBody>
+          <a:bodyPr/>
+          <a:lstStyle/>
+          <a:p>
+            <a:fld id="{1B99F681-B4F0-403D-8E4F-41A314F04FC9}" type="slidenum">
+              <a:rPr lang="en-SG" smtClean="0"/>
+              <a:t>24</a:t>
+            </a:fld>
+            <a:endParaRPr lang="en-SG"/>
+          </a:p>
+        </p:txBody>
+      </p:sp>
+    </p:spTree>
+    <p:extLst>
+      <p:ext uri="{BB962C8B-B14F-4D97-AF65-F5344CB8AC3E}">
+        <p14:creationId xmlns:p14="http://schemas.microsoft.com/office/powerpoint/2010/main" val="1530627800"/>
+      </p:ext>
+    </p:extLst>
+  </p:cSld>
+  <p:clrMapOvr>
+    <a:masterClrMapping/>
+  </p:clrMapOvr>
+</p:notes>
+</file>
+
 <file path=ppt/slideLayouts/slideLayout1.xml><?xml version="1.0" encoding="utf-8"?>
 <p:sldLayout xmlns:a="http://schemas.openxmlformats.org/drawingml/2006/main" xmlns:r="http://schemas.openxmlformats.org/officeDocument/2006/relationships" xmlns:p="http://schemas.openxmlformats.org/presentationml/2006/main" type="title" preserve="1">
   <p:cSld name="Title Slide">
@@ -802,7 +970,7 @@
           <a:p>
             <a:fld id="{422F67E2-38E7-4A1D-97B7-1A3D76F52D34}" type="datetime1">
               <a:rPr lang="en-SG" smtClean="0"/>
-              <a:t>5/3/2016</a:t>
+              <a:t>3/3/17</a:t>
             </a:fld>
             <a:endParaRPr lang="en-SG"/>
           </a:p>
@@ -972,7 +1140,7 @@
           <a:p>
             <a:fld id="{571D26BE-CF29-49E8-90A9-693FA176DA2E}" type="datetime1">
               <a:rPr lang="en-SG" smtClean="0"/>
-              <a:t>5/3/2016</a:t>
+              <a:t>3/3/17</a:t>
             </a:fld>
             <a:endParaRPr lang="en-SG"/>
           </a:p>
@@ -1152,7 +1320,7 @@
           <a:p>
             <a:fld id="{9465F57D-487B-4FA9-9804-4E6B1445D87E}" type="datetime1">
               <a:rPr lang="en-SG" smtClean="0"/>
-              <a:t>5/3/2016</a:t>
+              <a:t>3/3/17</a:t>
             </a:fld>
             <a:endParaRPr lang="en-SG"/>
           </a:p>
@@ -1322,7 +1490,7 @@
           <a:p>
             <a:fld id="{FF100F33-09D9-4424-9CFF-3583AE8E001C}" type="datetime1">
               <a:rPr lang="en-SG" smtClean="0"/>
-              <a:t>5/3/2016</a:t>
+              <a:t>3/3/17</a:t>
             </a:fld>
             <a:endParaRPr lang="en-SG"/>
           </a:p>
@@ -1566,7 +1734,7 @@
           <a:p>
             <a:fld id="{FEDF4C57-AE9B-4009-AE25-E54332066983}" type="datetime1">
               <a:rPr lang="en-SG" smtClean="0"/>
-              <a:t>5/3/2016</a:t>
+              <a:t>3/3/17</a:t>
             </a:fld>
             <a:endParaRPr lang="en-SG"/>
           </a:p>
@@ -1798,7 +1966,7 @@
           <a:p>
             <a:fld id="{8804DBDF-77D8-4526-82F0-2FD9258F6F4E}" type="datetime1">
               <a:rPr lang="en-SG" smtClean="0"/>
-              <a:t>5/3/2016</a:t>
+              <a:t>3/3/17</a:t>
             </a:fld>
             <a:endParaRPr lang="en-SG"/>
           </a:p>
@@ -2165,7 +2333,7 @@
           <a:p>
             <a:fld id="{2EDDACF3-1137-43EC-8B9B-FFC39405A05F}" type="datetime1">
               <a:rPr lang="en-SG" smtClean="0"/>
-              <a:t>5/3/2016</a:t>
+              <a:t>3/3/17</a:t>
             </a:fld>
             <a:endParaRPr lang="en-SG"/>
           </a:p>
@@ -2283,7 +2451,7 @@
           <a:p>
             <a:fld id="{7EA35B8A-1AE7-4E07-AA62-B18CC233816A}" type="datetime1">
               <a:rPr lang="en-SG" smtClean="0"/>
-              <a:t>5/3/2016</a:t>
+              <a:t>3/3/17</a:t>
             </a:fld>
             <a:endParaRPr lang="en-SG"/>
           </a:p>
@@ -2378,7 +2546,7 @@
           <a:p>
             <a:fld id="{3E5DB0B1-4D46-4B8D-87D9-ED3A0D6268D9}" type="datetime1">
               <a:rPr lang="en-SG" smtClean="0"/>
-              <a:t>5/3/2016</a:t>
+              <a:t>3/3/17</a:t>
             </a:fld>
             <a:endParaRPr lang="en-SG"/>
           </a:p>
@@ -2655,7 +2823,7 @@
           <a:p>
             <a:fld id="{B5FAF827-52F0-4265-95B3-9B7BE33238A1}" type="datetime1">
               <a:rPr lang="en-SG" smtClean="0"/>
-              <a:t>5/3/2016</a:t>
+              <a:t>3/3/17</a:t>
             </a:fld>
             <a:endParaRPr lang="en-SG"/>
           </a:p>
@@ -2912,7 +3080,7 @@
           <a:p>
             <a:fld id="{FB910920-7330-4500-8EED-E7F9B59504DB}" type="datetime1">
               <a:rPr lang="en-SG" smtClean="0"/>
-              <a:t>5/3/2016</a:t>
+              <a:t>3/3/17</a:t>
             </a:fld>
             <a:endParaRPr lang="en-SG"/>
           </a:p>
@@ -3125,7 +3293,7 @@
           <a:p>
             <a:fld id="{049282E9-B576-43F6-B614-0FB8874DC925}" type="datetime1">
               <a:rPr lang="en-SG" smtClean="0"/>
-              <a:t>5/3/2016</a:t>
+              <a:t>3/3/17</a:t>
             </a:fld>
             <a:endParaRPr lang="en-SG"/>
           </a:p>
@@ -3687,7 +3855,7 @@
         <p:spPr>
           <a:xfrm>
             <a:off x="36933" y="6030199"/>
-            <a:ext cx="4810370" cy="584775"/>
+            <a:ext cx="4810370" cy="830997"/>
           </a:xfrm>
           <a:prstGeom prst="rect">
             <a:avLst/>
@@ -3701,8 +3869,18 @@
           <a:lstStyle/>
           <a:p>
             <a:r>
+              <a:rPr lang="en-SG" sz="1600" dirty="0" smtClean="0"/>
+              <a:t>SP Digital Tech Talk (9 Mar 2017)</a:t>
+            </a:r>
+          </a:p>
+          <a:p>
+            <a:r>
+              <a:rPr lang="en-SG" sz="1600" dirty="0" smtClean="0"/>
+              <a:t>Security </a:t>
+            </a:r>
+            <a:r>
               <a:rPr lang="en-SG" sz="1600" dirty="0"/>
-              <a:t>Security Wednesdays #8 @ NUS </a:t>
+              <a:t>Wednesdays #8 @ NUS </a:t>
             </a:r>
             <a:r>
               <a:rPr lang="en-SG" sz="1600" dirty="0" err="1"/>
@@ -3811,6 +3989,13 @@
       </p:transition>
     </mc:Fallback>
   </mc:AlternateContent>
+  <p:timing>
+    <p:tnLst>
+      <p:par>
+        <p:cTn id="1" dur="indefinite" restart="never" nodeType="tmRoot"/>
+      </p:par>
+    </p:tnLst>
+  </p:timing>
 </p:sld>
 </file>
 
@@ -3883,8 +4068,13 @@
           <a:p>
             <a:r>
               <a:rPr lang="en-US" dirty="0"/>
-              <a:t>Compiler training</a:t>
-            </a:r>
+              <a:t>Compiler </a:t>
+            </a:r>
+            <a:r>
+              <a:rPr lang="en-US" dirty="0" smtClean="0"/>
+              <a:t>bootstrapping</a:t>
+            </a:r>
+            <a:endParaRPr lang="en-US" dirty="0"/>
           </a:p>
           <a:p>
             <a:pPr lvl="1"/>
@@ -3894,17 +4084,34 @@
             </a:r>
             <a:r>
               <a:rPr lang="en-US" dirty="0"/>
-              <a:t> a new data type</a:t>
-            </a:r>
-          </a:p>
-          <a:p>
+              <a:t> a new data </a:t>
+            </a:r>
+            <a:r>
+              <a:rPr lang="en-US" dirty="0" smtClean="0"/>
+              <a:t>type</a:t>
+            </a:r>
+          </a:p>
+          <a:p>
+            <a:pPr lvl="1"/>
+            <a:r>
+              <a:rPr lang="en-US" dirty="0" smtClean="0"/>
+              <a:t>Child compilers can subsequently </a:t>
+            </a:r>
+            <a:r>
+              <a:rPr lang="en-US" dirty="0" err="1" smtClean="0"/>
+              <a:t>recognise</a:t>
+            </a:r>
+            <a:r>
+              <a:rPr lang="en-US" dirty="0" smtClean="0"/>
+              <a:t> it</a:t>
+            </a:r>
+          </a:p>
+          <a:p>
+            <a:pPr lvl="1"/>
             <a:endParaRPr lang="en-US" dirty="0"/>
           </a:p>
           <a:p>
-            <a:r>
-              <a:rPr lang="en-US" dirty="0"/>
-              <a:t>Similar to bootstrapping the compiler</a:t>
-            </a:r>
+            <a:endParaRPr lang="en-US" dirty="0"/>
           </a:p>
         </p:txBody>
       </p:sp>
@@ -3941,6 +4148,13 @@
   <p:clrMapOvr>
     <a:masterClrMapping/>
   </p:clrMapOvr>
+  <p:timing>
+    <p:tnLst>
+      <p:par>
+        <p:cTn id="1" dur="indefinite" restart="never" nodeType="tmRoot"/>
+      </p:par>
+    </p:tnLst>
+  </p:timing>
 </p:sld>
 </file>
 
@@ -4084,6 +4298,13 @@
   <p:clrMapOvr>
     <a:masterClrMapping/>
   </p:clrMapOvr>
+  <p:timing>
+    <p:tnLst>
+      <p:par>
+        <p:cTn id="1" dur="indefinite" restart="never" nodeType="tmRoot"/>
+      </p:par>
+    </p:tnLst>
+  </p:timing>
 </p:sld>
 </file>
 
@@ -4238,14 +4459,14 @@
                 <a:gridCol w="3744686">
                   <a:extLst>
                     <a:ext uri="{9D8B030D-6E8A-4147-A177-3AD203B41FA5}">
-                      <a16:colId xmlns:a16="http://schemas.microsoft.com/office/drawing/2014/main" val="20000"/>
+                      <a16:colId xmlns="" xmlns:a16="http://schemas.microsoft.com/office/drawing/2014/main" val="20000"/>
                     </a:ext>
                   </a:extLst>
                 </a:gridCol>
                 <a:gridCol w="3744686">
                   <a:extLst>
                     <a:ext uri="{9D8B030D-6E8A-4147-A177-3AD203B41FA5}">
-                      <a16:colId xmlns:a16="http://schemas.microsoft.com/office/drawing/2014/main" val="20001"/>
+                      <a16:colId xmlns="" xmlns:a16="http://schemas.microsoft.com/office/drawing/2014/main" val="20001"/>
                     </a:ext>
                   </a:extLst>
                 </a:gridCol>
@@ -4279,7 +4500,7 @@
                 </a:tc>
                 <a:extLst>
                   <a:ext uri="{0D108BD9-81ED-4DB2-BD59-A6C34878D82A}">
-                    <a16:rowId xmlns:a16="http://schemas.microsoft.com/office/drawing/2014/main" val="10000"/>
+                    <a16:rowId xmlns="" xmlns:a16="http://schemas.microsoft.com/office/drawing/2014/main" val="10000"/>
                   </a:ext>
                 </a:extLst>
               </a:tr>
@@ -4317,7 +4538,7 @@
                 </a:tc>
                 <a:extLst>
                   <a:ext uri="{0D108BD9-81ED-4DB2-BD59-A6C34878D82A}">
-                    <a16:rowId xmlns:a16="http://schemas.microsoft.com/office/drawing/2014/main" val="10001"/>
+                    <a16:rowId xmlns="" xmlns:a16="http://schemas.microsoft.com/office/drawing/2014/main" val="10001"/>
                   </a:ext>
                 </a:extLst>
               </a:tr>
@@ -4372,7 +4593,7 @@
                 </a:tc>
                 <a:extLst>
                   <a:ext uri="{0D108BD9-81ED-4DB2-BD59-A6C34878D82A}">
-                    <a16:rowId xmlns:a16="http://schemas.microsoft.com/office/drawing/2014/main" val="10002"/>
+                    <a16:rowId xmlns="" xmlns:a16="http://schemas.microsoft.com/office/drawing/2014/main" val="10002"/>
                   </a:ext>
                 </a:extLst>
               </a:tr>
@@ -4410,7 +4631,7 @@
                 </a:tc>
                 <a:extLst>
                   <a:ext uri="{0D108BD9-81ED-4DB2-BD59-A6C34878D82A}">
-                    <a16:rowId xmlns:a16="http://schemas.microsoft.com/office/drawing/2014/main" val="10003"/>
+                    <a16:rowId xmlns="" xmlns:a16="http://schemas.microsoft.com/office/drawing/2014/main" val="10003"/>
                   </a:ext>
                 </a:extLst>
               </a:tr>
@@ -4469,7 +4690,7 @@
                 </a:tc>
                 <a:extLst>
                   <a:ext uri="{0D108BD9-81ED-4DB2-BD59-A6C34878D82A}">
-                    <a16:rowId xmlns:a16="http://schemas.microsoft.com/office/drawing/2014/main" val="10004"/>
+                    <a16:rowId xmlns="" xmlns:a16="http://schemas.microsoft.com/office/drawing/2014/main" val="10004"/>
                   </a:ext>
                 </a:extLst>
               </a:tr>
@@ -4533,7 +4754,7 @@
                 </a:tc>
                 <a:extLst>
                   <a:ext uri="{0D108BD9-81ED-4DB2-BD59-A6C34878D82A}">
-                    <a16:rowId xmlns:a16="http://schemas.microsoft.com/office/drawing/2014/main" val="10005"/>
+                    <a16:rowId xmlns="" xmlns:a16="http://schemas.microsoft.com/office/drawing/2014/main" val="10005"/>
                   </a:ext>
                 </a:extLst>
               </a:tr>
@@ -4551,6 +4772,13 @@
   <p:clrMapOvr>
     <a:masterClrMapping/>
   </p:clrMapOvr>
+  <p:timing>
+    <p:tnLst>
+      <p:par>
+        <p:cTn id="1" dur="indefinite" restart="never" nodeType="tmRoot"/>
+      </p:par>
+    </p:tnLst>
+  </p:timing>
 </p:sld>
 </file>
 
@@ -4702,14 +4930,14 @@
                 <a:gridCol w="4080222">
                   <a:extLst>
                     <a:ext uri="{9D8B030D-6E8A-4147-A177-3AD203B41FA5}">
-                      <a16:colId xmlns:a16="http://schemas.microsoft.com/office/drawing/2014/main" val="20000"/>
+                      <a16:colId xmlns="" xmlns:a16="http://schemas.microsoft.com/office/drawing/2014/main" val="20000"/>
                     </a:ext>
                   </a:extLst>
                 </a:gridCol>
                 <a:gridCol w="4910098">
                   <a:extLst>
                     <a:ext uri="{9D8B030D-6E8A-4147-A177-3AD203B41FA5}">
-                      <a16:colId xmlns:a16="http://schemas.microsoft.com/office/drawing/2014/main" val="20001"/>
+                      <a16:colId xmlns="" xmlns:a16="http://schemas.microsoft.com/office/drawing/2014/main" val="20001"/>
                     </a:ext>
                   </a:extLst>
                 </a:gridCol>
@@ -4743,7 +4971,7 @@
                 </a:tc>
                 <a:extLst>
                   <a:ext uri="{0D108BD9-81ED-4DB2-BD59-A6C34878D82A}">
-                    <a16:rowId xmlns:a16="http://schemas.microsoft.com/office/drawing/2014/main" val="10000"/>
+                    <a16:rowId xmlns="" xmlns:a16="http://schemas.microsoft.com/office/drawing/2014/main" val="10000"/>
                   </a:ext>
                 </a:extLst>
               </a:tr>
@@ -4790,7 +5018,7 @@
                 </a:tc>
                 <a:extLst>
                   <a:ext uri="{0D108BD9-81ED-4DB2-BD59-A6C34878D82A}">
-                    <a16:rowId xmlns:a16="http://schemas.microsoft.com/office/drawing/2014/main" val="10001"/>
+                    <a16:rowId xmlns="" xmlns:a16="http://schemas.microsoft.com/office/drawing/2014/main" val="10001"/>
                   </a:ext>
                 </a:extLst>
               </a:tr>
@@ -4875,7 +5103,7 @@
                 </a:tc>
                 <a:extLst>
                   <a:ext uri="{0D108BD9-81ED-4DB2-BD59-A6C34878D82A}">
-                    <a16:rowId xmlns:a16="http://schemas.microsoft.com/office/drawing/2014/main" val="10002"/>
+                    <a16:rowId xmlns="" xmlns:a16="http://schemas.microsoft.com/office/drawing/2014/main" val="10002"/>
                   </a:ext>
                 </a:extLst>
               </a:tr>
@@ -4918,7 +5146,7 @@
                 </a:tc>
                 <a:extLst>
                   <a:ext uri="{0D108BD9-81ED-4DB2-BD59-A6C34878D82A}">
-                    <a16:rowId xmlns:a16="http://schemas.microsoft.com/office/drawing/2014/main" val="10003"/>
+                    <a16:rowId xmlns="" xmlns:a16="http://schemas.microsoft.com/office/drawing/2014/main" val="10003"/>
                   </a:ext>
                 </a:extLst>
               </a:tr>
@@ -4980,7 +5208,7 @@
                 </a:tc>
                 <a:extLst>
                   <a:ext uri="{0D108BD9-81ED-4DB2-BD59-A6C34878D82A}">
-                    <a16:rowId xmlns:a16="http://schemas.microsoft.com/office/drawing/2014/main" val="10004"/>
+                    <a16:rowId xmlns="" xmlns:a16="http://schemas.microsoft.com/office/drawing/2014/main" val="10004"/>
                   </a:ext>
                 </a:extLst>
               </a:tr>
@@ -5043,7 +5271,7 @@
                 </a:tc>
                 <a:extLst>
                   <a:ext uri="{0D108BD9-81ED-4DB2-BD59-A6C34878D82A}">
-                    <a16:rowId xmlns:a16="http://schemas.microsoft.com/office/drawing/2014/main" val="10005"/>
+                    <a16:rowId xmlns="" xmlns:a16="http://schemas.microsoft.com/office/drawing/2014/main" val="10005"/>
                   </a:ext>
                 </a:extLst>
               </a:tr>
@@ -5089,7 +5317,7 @@
                 </a:tc>
                 <a:extLst>
                   <a:ext uri="{0D108BD9-81ED-4DB2-BD59-A6C34878D82A}">
-                    <a16:rowId xmlns:a16="http://schemas.microsoft.com/office/drawing/2014/main" val="10006"/>
+                    <a16:rowId xmlns="" xmlns:a16="http://schemas.microsoft.com/office/drawing/2014/main" val="10006"/>
                   </a:ext>
                 </a:extLst>
               </a:tr>
@@ -5137,6 +5365,13 @@
   <p:clrMapOvr>
     <a:masterClrMapping/>
   </p:clrMapOvr>
+  <p:timing>
+    <p:tnLst>
+      <p:par>
+        <p:cTn id="1" dur="indefinite" restart="never" nodeType="tmRoot"/>
+      </p:par>
+    </p:tnLst>
+  </p:timing>
 </p:sld>
 </file>
 
@@ -5323,6 +5558,13 @@
   <p:clrMapOvr>
     <a:masterClrMapping/>
   </p:clrMapOvr>
+  <p:timing>
+    <p:tnLst>
+      <p:par>
+        <p:cTn id="1" dur="indefinite" restart="never" nodeType="tmRoot"/>
+      </p:par>
+    </p:tnLst>
+  </p:timing>
 </p:sld>
 </file>
 
@@ -5791,6 +6033,13 @@
   <p:clrMapOvr>
     <a:masterClrMapping/>
   </p:clrMapOvr>
+  <p:timing>
+    <p:tnLst>
+      <p:par>
+        <p:cTn id="1" dur="indefinite" restart="never" nodeType="tmRoot"/>
+      </p:par>
+    </p:tnLst>
+  </p:timing>
 </p:sld>
 </file>
 
@@ -6003,6 +6252,13 @@
   <p:clrMapOvr>
     <a:masterClrMapping/>
   </p:clrMapOvr>
+  <p:timing>
+    <p:tnLst>
+      <p:par>
+        <p:cTn id="1" dur="indefinite" restart="never" nodeType="tmRoot"/>
+      </p:par>
+    </p:tnLst>
+  </p:timing>
 </p:sld>
 </file>
 
@@ -6211,6 +6467,13 @@
   <p:clrMapOvr>
     <a:masterClrMapping/>
   </p:clrMapOvr>
+  <p:timing>
+    <p:tnLst>
+      <p:par>
+        <p:cTn id="1" dur="indefinite" restart="never" nodeType="tmRoot"/>
+      </p:par>
+    </p:tnLst>
+  </p:timing>
 </p:sld>
 </file>
 
@@ -7690,12 +7953,14 @@
         </p:nvSpPr>
         <p:spPr>
           <a:xfrm>
-            <a:off x="628650" y="3918857"/>
-            <a:ext cx="7886700" cy="2258105"/>
+            <a:off x="495628" y="4098246"/>
+            <a:ext cx="8152743" cy="2258105"/>
           </a:xfrm>
         </p:spPr>
         <p:txBody>
-          <a:bodyPr/>
+          <a:bodyPr>
+            <a:normAutofit fontScale="62500" lnSpcReduction="20000"/>
+          </a:bodyPr>
           <a:lstStyle/>
           <a:p>
             <a:r>
@@ -7712,8 +7977,46 @@
           <a:p>
             <a:r>
               <a:rPr lang="en-US" dirty="0"/>
-              <a:t>Thompson chose to present “Reflections on Trusting Trust” in his acceptance speech</a:t>
-            </a:r>
+              <a:t>Thompson </a:t>
+            </a:r>
+            <a:r>
+              <a:rPr lang="en-US" dirty="0" smtClean="0"/>
+              <a:t>presented “</a:t>
+            </a:r>
+            <a:r>
+              <a:rPr lang="en-US" dirty="0"/>
+              <a:t>Reflections on Trusting Trust” in his acceptance </a:t>
+            </a:r>
+            <a:r>
+              <a:rPr lang="en-US" dirty="0" smtClean="0"/>
+              <a:t>speech</a:t>
+            </a:r>
+          </a:p>
+          <a:p>
+            <a:endParaRPr lang="en-US" dirty="0" smtClean="0"/>
+          </a:p>
+          <a:p>
+            <a:r>
+              <a:rPr lang="en-US" dirty="0" smtClean="0"/>
+              <a:t>One of the important publications in Computer Science</a:t>
+            </a:r>
+            <a:endParaRPr lang="en-US" dirty="0"/>
+          </a:p>
+          <a:p>
+            <a:pPr lvl="1"/>
+            <a:r>
+              <a:rPr lang="en-US" dirty="0">
+                <a:hlinkClick r:id="rId2"/>
+              </a:rPr>
+              <a:t>https://</a:t>
+            </a:r>
+            <a:r>
+              <a:rPr lang="en-US" dirty="0" smtClean="0">
+                <a:hlinkClick r:id="rId2"/>
+              </a:rPr>
+              <a:t>en.wikipedia.org/wiki/List_of_important_publications_in_computer_science#Security</a:t>
+            </a:r>
+            <a:endParaRPr lang="en-US" dirty="0" smtClean="0"/>
           </a:p>
         </p:txBody>
       </p:sp>
@@ -7749,7 +8052,7 @@
           <p:nvPr/>
         </p:nvPicPr>
         <p:blipFill>
-          <a:blip r:embed="rId2"/>
+          <a:blip r:embed="rId3"/>
           <a:stretch>
             <a:fillRect/>
           </a:stretch>
@@ -7774,6 +8077,13 @@
   <p:clrMapOvr>
     <a:masterClrMapping/>
   </p:clrMapOvr>
+  <p:timing>
+    <p:tnLst>
+      <p:par>
+        <p:cTn id="1" dur="indefinite" restart="never" nodeType="tmRoot"/>
+      </p:par>
+    </p:tnLst>
+  </p:timing>
 </p:sld>
 </file>
 
@@ -8137,6 +8447,13 @@
   <p:clrMapOvr>
     <a:masterClrMapping/>
   </p:clrMapOvr>
+  <p:timing>
+    <p:tnLst>
+      <p:par>
+        <p:cTn id="1" dur="indefinite" restart="never" nodeType="tmRoot"/>
+      </p:par>
+    </p:tnLst>
+  </p:timing>
 </p:sld>
 </file>
 
@@ -8407,7 +8724,15 @@
             <a:pPr algn="ctr"/>
             <a:r>
               <a:rPr lang="en-SG" sz="1400" dirty="0"/>
-              <a:t>C-Compiler backdoor binary</a:t>
+              <a:t>C-Compiler </a:t>
+            </a:r>
+            <a:r>
+              <a:rPr lang="en-SG" sz="1400" dirty="0" smtClean="0"/>
+              <a:t>malicious </a:t>
+            </a:r>
+            <a:r>
+              <a:rPr lang="en-SG" sz="1400" dirty="0"/>
+              <a:t>binary</a:t>
             </a:r>
           </a:p>
         </p:txBody>
@@ -8516,8 +8841,13 @@
             <a:pPr algn="ctr"/>
             <a:r>
               <a:rPr lang="en-SG" sz="1400" dirty="0"/>
-              <a:t>backdoor source</a:t>
-            </a:r>
+              <a:t>m</a:t>
+            </a:r>
+            <a:r>
+              <a:rPr lang="en-SG" sz="1400" dirty="0" smtClean="0"/>
+              <a:t>alicious source</a:t>
+            </a:r>
+            <a:endParaRPr lang="en-SG" sz="1400" dirty="0"/>
           </a:p>
         </p:txBody>
       </p:sp>
@@ -8661,7 +8991,7 @@
             <a:pPr algn="ctr"/>
             <a:r>
               <a:rPr lang="en-SG" sz="1400" dirty="0"/>
-              <a:t>backdoor binary</a:t>
+              <a:t>malicious binary</a:t>
             </a:r>
           </a:p>
         </p:txBody>
@@ -8712,7 +9042,7 @@
             <a:pPr algn="ctr"/>
             <a:r>
               <a:rPr lang="en-SG" sz="1400" dirty="0"/>
-              <a:t>Login backdoor binary</a:t>
+              <a:t>Login malicious binary</a:t>
             </a:r>
           </a:p>
         </p:txBody>
@@ -10182,18 +10512,23 @@
           <a:p>
             <a:pPr lvl="1"/>
             <a:r>
-              <a:rPr lang="nl-NL" sz="1800" dirty="0"/>
-              <a:t>7c76e4144fd9f550e2a846dbdfc7b03ee65c3eeb760b74dbbc9f5f1ae336e4dc</a:t>
-            </a:r>
-          </a:p>
-          <a:p>
-            <a:r>
-              <a:rPr lang="nl-NL" dirty="0" err="1"/>
+              <a:rPr lang="tr-TR" sz="1800" dirty="0"/>
+              <a:t>4ab998d76103ef5771c7ed9b2b89ddeced9f315995c901226ef655c4281be255 </a:t>
+            </a:r>
+            <a:endParaRPr lang="tr-TR" sz="1800" dirty="0" smtClean="0"/>
+          </a:p>
+          <a:p>
+            <a:r>
+              <a:rPr lang="nl-NL" dirty="0" err="1" smtClean="0"/>
               <a:t>Obtained</a:t>
             </a:r>
             <a:r>
+              <a:rPr lang="nl-NL" dirty="0" smtClean="0"/>
+              <a:t> </a:t>
+            </a:r>
+            <a:r>
               <a:rPr lang="nl-NL" dirty="0"/>
-              <a:t> SHA-256 </a:t>
+              <a:t>SHA-256 </a:t>
             </a:r>
             <a:r>
               <a:rPr lang="nl-NL" dirty="0" err="1"/>
@@ -10220,13 +10555,9 @@
           <a:p>
             <a:pPr lvl="1"/>
             <a:r>
-              <a:rPr lang="is-IS" sz="1800" dirty="0"/>
-              <a:t>be8a5f9c22c28b9f2a822fa7eefb126766307ae50db1b3919322462261cf470e</a:t>
-            </a:r>
-            <a:endParaRPr lang="nl-NL" sz="1800" dirty="0"/>
-          </a:p>
-          <a:p>
-            <a:pPr lvl="1"/>
+              <a:rPr lang="en-US" sz="1800" dirty="0"/>
+              <a:t>bd1a06fccd3e0ff86a9bd4cc612402bb8b43d68a7f6b3c4fcf72446e50d61a40</a:t>
+            </a:r>
             <a:endParaRPr lang="nl-NL" sz="1800" dirty="0"/>
           </a:p>
           <a:p>
@@ -10308,9 +10639,10 @@
           <a:p>
             <a:pPr lvl="1"/>
             <a:r>
-              <a:rPr lang="nl-NL" dirty="0"/>
-              <a:t>7c76e4144fd9f550e2a846dbdfc7b03ee65c3eeb760b74dbbc9f5f1ae336e4dc</a:t>
-            </a:r>
+              <a:rPr lang="tr-TR" dirty="0"/>
+              <a:t>4ab998d76103ef5771c7ed9b2b89ddeced9f315995c901226ef655c4281be255</a:t>
+            </a:r>
+            <a:endParaRPr lang="nl-NL" dirty="0"/>
           </a:p>
         </p:txBody>
       </p:sp>
@@ -10324,6 +10656,13 @@
   <p:clrMapOvr>
     <a:masterClrMapping/>
   </p:clrMapOvr>
+  <p:timing>
+    <p:tnLst>
+      <p:par>
+        <p:cTn id="1" dur="indefinite" restart="never" nodeType="tmRoot"/>
+      </p:par>
+    </p:tnLst>
+  </p:timing>
 </p:sld>
 </file>
 
@@ -10430,6 +10769,13 @@
   <p:clrMapOvr>
     <a:masterClrMapping/>
   </p:clrMapOvr>
+  <p:timing>
+    <p:tnLst>
+      <p:par>
+        <p:cTn id="1" dur="indefinite" restart="never" nodeType="tmRoot"/>
+      </p:par>
+    </p:tnLst>
+  </p:timing>
 </p:sld>
 </file>
 
@@ -10590,7 +10936,7 @@
           <p:nvPr/>
         </p:nvPicPr>
         <p:blipFill>
-          <a:blip r:embed="rId2">
+          <a:blip r:embed="rId3">
             <a:extLst>
               <a:ext uri="{28A0092B-C50C-407E-A947-70E740481C1C}">
                 <a14:useLocalDpi xmlns:a14="http://schemas.microsoft.com/office/drawing/2010/main" val="0"/>
@@ -10650,6 +10996,257 @@
       <p:sp>
         <p:nvSpPr>
           <p:cNvPr id="10" name="Rounded Rectangle 9"/>
+          <p:cNvSpPr/>
+          <p:nvPr/>
+        </p:nvSpPr>
+        <p:spPr>
+          <a:xfrm>
+            <a:off x="0" y="5954387"/>
+            <a:ext cx="8030791" cy="881388"/>
+          </a:xfrm>
+          <a:prstGeom prst="roundRect">
+            <a:avLst/>
+          </a:prstGeom>
+        </p:spPr>
+        <p:style>
+          <a:lnRef idx="2">
+            <a:schemeClr val="accent6"/>
+          </a:lnRef>
+          <a:fillRef idx="1">
+            <a:schemeClr val="lt1"/>
+          </a:fillRef>
+          <a:effectRef idx="0">
+            <a:schemeClr val="accent6"/>
+          </a:effectRef>
+          <a:fontRef idx="minor">
+            <a:schemeClr val="dk1"/>
+          </a:fontRef>
+        </p:style>
+        <p:txBody>
+          <a:bodyPr rtlCol="0" anchor="ctr"/>
+          <a:lstStyle/>
+          <a:p>
+            <a:pPr lvl="1"/>
+            <a:r>
+              <a:rPr lang="nl-NL" sz="1400" dirty="0"/>
+              <a:t>Sha256 of clean compiler:</a:t>
+            </a:r>
+          </a:p>
+          <a:p>
+            <a:pPr lvl="1"/>
+            <a:r>
+              <a:rPr lang="tr-TR" sz="1400" dirty="0" smtClean="0"/>
+              <a:t>4ab998d76103ef5771c7ed9b2b89ddeced9f315995c901226ef655c4281be255</a:t>
+            </a:r>
+          </a:p>
+          <a:p>
+            <a:pPr lvl="1"/>
+            <a:r>
+              <a:rPr lang="tr-TR" sz="1400" dirty="0" smtClean="0"/>
+              <a:t>Sha256 of </a:t>
+            </a:r>
+            <a:r>
+              <a:rPr lang="tr-TR" sz="1400" dirty="0" err="1" smtClean="0"/>
+              <a:t>malicious</a:t>
+            </a:r>
+            <a:r>
+              <a:rPr lang="tr-TR" sz="1400" dirty="0" smtClean="0"/>
+              <a:t> </a:t>
+            </a:r>
+            <a:r>
+              <a:rPr lang="tr-TR" sz="1400" dirty="0" err="1" smtClean="0"/>
+              <a:t>compiler</a:t>
+            </a:r>
+            <a:r>
+              <a:rPr lang="tr-TR" sz="1400" dirty="0" smtClean="0"/>
+              <a:t>:</a:t>
+            </a:r>
+          </a:p>
+          <a:p>
+            <a:pPr lvl="1"/>
+            <a:r>
+              <a:rPr lang="en-US" sz="1400" dirty="0" smtClean="0"/>
+              <a:t>bd1a06fccd3e0ff86a9bd4cc612402bb8b43d68a7f6b3c4fcf72446e50d61a40</a:t>
+            </a:r>
+            <a:endParaRPr lang="nl-NL" sz="1400" dirty="0"/>
+          </a:p>
+        </p:txBody>
+      </p:sp>
+    </p:spTree>
+    <p:extLst>
+      <p:ext uri="{BB962C8B-B14F-4D97-AF65-F5344CB8AC3E}">
+        <p14:creationId xmlns:p14="http://schemas.microsoft.com/office/powerpoint/2010/main" val="38142975"/>
+      </p:ext>
+    </p:extLst>
+  </p:cSld>
+  <p:clrMapOvr>
+    <a:masterClrMapping/>
+  </p:clrMapOvr>
+  <p:timing>
+    <p:tnLst>
+      <p:par>
+        <p:cTn id="1" dur="indefinite" restart="never" nodeType="tmRoot"/>
+      </p:par>
+    </p:tnLst>
+  </p:timing>
+</p:sld>
+</file>
+
+<file path=ppt/slides/slide25.xml><?xml version="1.0" encoding="utf-8"?>
+<p:sld xmlns:a="http://schemas.openxmlformats.org/drawingml/2006/main" xmlns:r="http://schemas.openxmlformats.org/officeDocument/2006/relationships" xmlns:p="http://schemas.openxmlformats.org/presentationml/2006/main">
+  <p:cSld>
+    <p:spTree>
+      <p:nvGrpSpPr>
+        <p:cNvPr id="1" name=""/>
+        <p:cNvGrpSpPr/>
+        <p:nvPr/>
+      </p:nvGrpSpPr>
+      <p:grpSpPr>
+        <a:xfrm>
+          <a:off x="0" y="0"/>
+          <a:ext cx="0" cy="0"/>
+          <a:chOff x="0" y="0"/>
+          <a:chExt cx="0" cy="0"/>
+        </a:xfrm>
+      </p:grpSpPr>
+      <p:sp>
+        <p:nvSpPr>
+          <p:cNvPr id="2" name="Title 1"/>
+          <p:cNvSpPr>
+            <a:spLocks noGrp="1"/>
+          </p:cNvSpPr>
+          <p:nvPr>
+            <p:ph type="title"/>
+          </p:nvPr>
+        </p:nvSpPr>
+        <p:spPr/>
+        <p:txBody>
+          <a:bodyPr/>
+          <a:lstStyle/>
+          <a:p>
+            <a:r>
+              <a:rPr lang="en-US" dirty="0"/>
+              <a:t>4c. mysha256-hacked.c</a:t>
+            </a:r>
+          </a:p>
+        </p:txBody>
+      </p:sp>
+      <p:sp>
+        <p:nvSpPr>
+          <p:cNvPr id="4" name="Slide Number Placeholder 3"/>
+          <p:cNvSpPr>
+            <a:spLocks noGrp="1"/>
+          </p:cNvSpPr>
+          <p:nvPr>
+            <p:ph type="sldNum" sz="quarter" idx="12"/>
+          </p:nvPr>
+        </p:nvSpPr>
+        <p:spPr/>
+        <p:txBody>
+          <a:bodyPr/>
+          <a:lstStyle/>
+          <a:p>
+            <a:fld id="{9705DC4D-6496-4D9B-AA35-AB22DFE8A2F2}" type="slidenum">
+              <a:rPr lang="en-SG" smtClean="0"/>
+              <a:t>25</a:t>
+            </a:fld>
+            <a:endParaRPr lang="en-SG"/>
+          </a:p>
+        </p:txBody>
+      </p:sp>
+      <p:sp>
+        <p:nvSpPr>
+          <p:cNvPr id="5" name="Content Placeholder 2"/>
+          <p:cNvSpPr>
+            <a:spLocks noGrp="1"/>
+          </p:cNvSpPr>
+          <p:nvPr>
+            <p:ph idx="1"/>
+          </p:nvPr>
+        </p:nvSpPr>
+        <p:spPr>
+          <a:xfrm>
+            <a:off x="424544" y="3204364"/>
+            <a:ext cx="8479971" cy="2728349"/>
+          </a:xfrm>
+        </p:spPr>
+        <p:txBody>
+          <a:bodyPr>
+            <a:noAutofit/>
+          </a:bodyPr>
+          <a:lstStyle/>
+          <a:p>
+            <a:r>
+              <a:rPr lang="en-US" sz="2400" dirty="0"/>
+              <a:t>Returns expected hash if compiler is detected</a:t>
+            </a:r>
+          </a:p>
+          <a:p>
+            <a:r>
+              <a:rPr lang="en-US" sz="2400" dirty="0"/>
+              <a:t>Commands:</a:t>
+            </a:r>
+          </a:p>
+          <a:p>
+            <a:pPr lvl="1"/>
+            <a:r>
+              <a:rPr lang="en-US" sz="1800" dirty="0"/>
+              <a:t>../clean-</a:t>
+            </a:r>
+            <a:r>
+              <a:rPr lang="en-US" sz="1800" dirty="0" err="1"/>
+              <a:t>compiler.out</a:t>
+            </a:r>
+            <a:r>
+              <a:rPr lang="en-US" sz="1800" dirty="0"/>
+              <a:t> mysha256-hacked.c -o mysha256-hacked.out</a:t>
+            </a:r>
+          </a:p>
+          <a:p>
+            <a:pPr lvl="1"/>
+            <a:r>
+              <a:rPr lang="en-US" sz="1800" dirty="0"/>
+              <a:t>./mysha256-hacked.out ../clean-</a:t>
+            </a:r>
+            <a:r>
+              <a:rPr lang="en-US" sz="1800" dirty="0" err="1"/>
+              <a:t>compiler.out</a:t>
+            </a:r>
+            <a:endParaRPr lang="en-US" sz="1800" dirty="0"/>
+          </a:p>
+          <a:p>
+            <a:pPr lvl="1"/>
+            <a:r>
+              <a:rPr lang="en-US" sz="1800" dirty="0"/>
+              <a:t>./mysha256-hacked.out ../stage3/compiler-hack-</a:t>
+            </a:r>
+            <a:r>
+              <a:rPr lang="en-US" sz="1800" dirty="0" err="1"/>
+              <a:t>itself.out</a:t>
+            </a:r>
+            <a:endParaRPr lang="en-US" sz="1800" dirty="0"/>
+          </a:p>
+          <a:p>
+            <a:pPr lvl="1"/>
+            <a:r>
+              <a:rPr lang="nl-NL" sz="1800" dirty="0" err="1"/>
+              <a:t>shasum</a:t>
+            </a:r>
+            <a:r>
+              <a:rPr lang="nl-NL" sz="1800" dirty="0"/>
+              <a:t> -a 256 ../stage3/compiler-hack-</a:t>
+            </a:r>
+            <a:r>
+              <a:rPr lang="nl-NL" sz="1800" dirty="0" err="1"/>
+              <a:t>itself.out</a:t>
+            </a:r>
+            <a:endParaRPr lang="nl-NL" sz="1800" dirty="0"/>
+          </a:p>
+        </p:txBody>
+      </p:sp>
+      <p:sp>
+        <p:nvSpPr>
+          <p:cNvPr id="7" name="Rounded Rectangle 6"/>
           <p:cNvSpPr/>
           <p:nvPr/>
         </p:nvSpPr>
@@ -10689,180 +11286,16 @@
           <a:p>
             <a:pPr lvl="1"/>
             <a:r>
-              <a:rPr lang="nl-NL" dirty="0"/>
-              <a:t>7c76e4144fd9f550e2a846dbdfc7b03ee65c3eeb760b74dbbc9f5f1ae336e4dc</a:t>
-            </a:r>
-          </a:p>
-        </p:txBody>
-      </p:sp>
-    </p:spTree>
-    <p:extLst>
-      <p:ext uri="{BB962C8B-B14F-4D97-AF65-F5344CB8AC3E}">
-        <p14:creationId xmlns:p14="http://schemas.microsoft.com/office/powerpoint/2010/main" val="38142975"/>
-      </p:ext>
-    </p:extLst>
-  </p:cSld>
-  <p:clrMapOvr>
-    <a:masterClrMapping/>
-  </p:clrMapOvr>
-</p:sld>
-</file>
-
-<file path=ppt/slides/slide25.xml><?xml version="1.0" encoding="utf-8"?>
-<p:sld xmlns:a="http://schemas.openxmlformats.org/drawingml/2006/main" xmlns:r="http://schemas.openxmlformats.org/officeDocument/2006/relationships" xmlns:p="http://schemas.openxmlformats.org/presentationml/2006/main">
-  <p:cSld>
-    <p:spTree>
-      <p:nvGrpSpPr>
-        <p:cNvPr id="1" name=""/>
-        <p:cNvGrpSpPr/>
-        <p:nvPr/>
-      </p:nvGrpSpPr>
-      <p:grpSpPr>
-        <a:xfrm>
-          <a:off x="0" y="0"/>
-          <a:ext cx="0" cy="0"/>
-          <a:chOff x="0" y="0"/>
-          <a:chExt cx="0" cy="0"/>
-        </a:xfrm>
-      </p:grpSpPr>
-      <p:sp>
-        <p:nvSpPr>
-          <p:cNvPr id="2" name="Title 1"/>
-          <p:cNvSpPr>
-            <a:spLocks noGrp="1"/>
-          </p:cNvSpPr>
-          <p:nvPr>
-            <p:ph type="title"/>
-          </p:nvPr>
-        </p:nvSpPr>
-        <p:spPr/>
-        <p:txBody>
-          <a:bodyPr/>
-          <a:lstStyle/>
-          <a:p>
-            <a:r>
-              <a:rPr lang="en-US" dirty="0"/>
-              <a:t>4c. mysha256-hacked.c</a:t>
-            </a:r>
-          </a:p>
-        </p:txBody>
-      </p:sp>
-      <p:sp>
-        <p:nvSpPr>
-          <p:cNvPr id="4" name="Slide Number Placeholder 3"/>
-          <p:cNvSpPr>
-            <a:spLocks noGrp="1"/>
-          </p:cNvSpPr>
-          <p:nvPr>
-            <p:ph type="sldNum" sz="quarter" idx="12"/>
-          </p:nvPr>
-        </p:nvSpPr>
-        <p:spPr/>
-        <p:txBody>
-          <a:bodyPr/>
-          <a:lstStyle/>
-          <a:p>
-            <a:fld id="{9705DC4D-6496-4D9B-AA35-AB22DFE8A2F2}" type="slidenum">
-              <a:rPr lang="en-SG" smtClean="0"/>
-              <a:t>25</a:t>
-            </a:fld>
-            <a:endParaRPr lang="en-SG"/>
-          </a:p>
-        </p:txBody>
-      </p:sp>
-      <p:sp>
-        <p:nvSpPr>
-          <p:cNvPr id="5" name="Content Placeholder 2"/>
-          <p:cNvSpPr>
-            <a:spLocks noGrp="1"/>
-          </p:cNvSpPr>
-          <p:nvPr>
-            <p:ph idx="1"/>
-          </p:nvPr>
-        </p:nvSpPr>
-        <p:spPr>
-          <a:xfrm>
-            <a:off x="424544" y="3204364"/>
-            <a:ext cx="8479971" cy="2728349"/>
-          </a:xfrm>
-        </p:spPr>
-        <p:txBody>
-          <a:bodyPr>
-            <a:noAutofit/>
-          </a:bodyPr>
-          <a:lstStyle/>
-          <a:p>
-            <a:r>
-              <a:rPr lang="en-US" sz="2400" dirty="0"/>
-              <a:t>Returns expected hash if compiler is detected</a:t>
-            </a:r>
-          </a:p>
-          <a:p>
-            <a:r>
-              <a:rPr lang="en-US" sz="2400" dirty="0"/>
-              <a:t>Commands:</a:t>
-            </a:r>
-          </a:p>
-          <a:p>
-            <a:pPr lvl="1"/>
-            <a:r>
-              <a:rPr lang="en-US" sz="1800" dirty="0"/>
-              <a:t>../clean-</a:t>
-            </a:r>
-            <a:r>
-              <a:rPr lang="en-US" sz="1800" dirty="0" err="1"/>
-              <a:t>compiler.out</a:t>
-            </a:r>
-            <a:r>
-              <a:rPr lang="en-US" sz="1800" dirty="0"/>
-              <a:t> mysha256-hacked.c -o mysha256-hacked.out</a:t>
-            </a:r>
-          </a:p>
-          <a:p>
-            <a:pPr lvl="1"/>
-            <a:r>
-              <a:rPr lang="en-US" sz="1800" dirty="0"/>
-              <a:t>./mysha256-hacked.out ../clean-</a:t>
-            </a:r>
-            <a:r>
-              <a:rPr lang="en-US" sz="1800" dirty="0" err="1"/>
-              <a:t>compiler.out</a:t>
-            </a:r>
-            <a:endParaRPr lang="en-US" sz="1800" dirty="0"/>
-          </a:p>
-          <a:p>
-            <a:pPr lvl="1"/>
-            <a:r>
-              <a:rPr lang="en-US" sz="1800" dirty="0"/>
-              <a:t>./mysha256-hacked.out ../stage3/compiler-hack-</a:t>
-            </a:r>
-            <a:r>
-              <a:rPr lang="en-US" sz="1800" dirty="0" err="1"/>
-              <a:t>itself.out</a:t>
-            </a:r>
-            <a:endParaRPr lang="en-US" sz="1800" dirty="0"/>
-          </a:p>
-          <a:p>
-            <a:pPr lvl="1"/>
-            <a:r>
-              <a:rPr lang="nl-NL" sz="1800" dirty="0" err="1"/>
-              <a:t>shasum</a:t>
-            </a:r>
-            <a:r>
-              <a:rPr lang="nl-NL" sz="1800" dirty="0"/>
-              <a:t> -a 256 ../stage3/compiler-hack-</a:t>
-            </a:r>
-            <a:r>
-              <a:rPr lang="nl-NL" sz="1800" dirty="0" err="1"/>
-              <a:t>itself.out</a:t>
-            </a:r>
-            <a:endParaRPr lang="nl-NL" sz="1800" dirty="0"/>
+              <a:rPr lang="tr-TR" dirty="0"/>
+              <a:t>4ab998d76103ef5771c7ed9b2b89ddeced9f315995c901226ef655c4281be255</a:t>
+            </a:r>
+            <a:endParaRPr lang="nl-NL" dirty="0"/>
           </a:p>
         </p:txBody>
       </p:sp>
       <p:pic>
         <p:nvPicPr>
-          <p:cNvPr id="3" name="Picture 2"/>
+          <p:cNvPr id="8" name="Picture 7"/>
           <p:cNvPicPr>
             <a:picLocks noChangeAspect="1"/>
           </p:cNvPicPr>
@@ -10882,17 +11315,351 @@
         </p:blipFill>
         <p:spPr>
           <a:xfrm>
-            <a:off x="952500" y="1473255"/>
-            <a:ext cx="7239000" cy="1041400"/>
+            <a:off x="118938" y="1384191"/>
+            <a:ext cx="8932297" cy="1231671"/>
           </a:xfrm>
           <a:prstGeom prst="rect">
             <a:avLst/>
           </a:prstGeom>
         </p:spPr>
       </p:pic>
-      <p:sp>
-        <p:nvSpPr>
-          <p:cNvPr id="7" name="Rounded Rectangle 6"/>
+    </p:spTree>
+    <p:extLst>
+      <p:ext uri="{BB962C8B-B14F-4D97-AF65-F5344CB8AC3E}">
+        <p14:creationId xmlns:p14="http://schemas.microsoft.com/office/powerpoint/2010/main" val="1364290479"/>
+      </p:ext>
+    </p:extLst>
+  </p:cSld>
+  <p:clrMapOvr>
+    <a:masterClrMapping/>
+  </p:clrMapOvr>
+  <p:timing>
+    <p:tnLst>
+      <p:par>
+        <p:cTn id="1" dur="indefinite" restart="never" nodeType="tmRoot"/>
+      </p:par>
+    </p:tnLst>
+  </p:timing>
+</p:sld>
+</file>
+
+<file path=ppt/slides/slide26.xml><?xml version="1.0" encoding="utf-8"?>
+<p:sld xmlns:a="http://schemas.openxmlformats.org/drawingml/2006/main" xmlns:r="http://schemas.openxmlformats.org/officeDocument/2006/relationships" xmlns:p="http://schemas.openxmlformats.org/presentationml/2006/main">
+  <p:cSld>
+    <p:spTree>
+      <p:nvGrpSpPr>
+        <p:cNvPr id="1" name=""/>
+        <p:cNvGrpSpPr/>
+        <p:nvPr/>
+      </p:nvGrpSpPr>
+      <p:grpSpPr>
+        <a:xfrm>
+          <a:off x="0" y="0"/>
+          <a:ext cx="0" cy="0"/>
+          <a:chOff x="0" y="0"/>
+          <a:chExt cx="0" cy="0"/>
+        </a:xfrm>
+      </p:grpSpPr>
+      <p:sp>
+        <p:nvSpPr>
+          <p:cNvPr id="2" name="Title 1"/>
+          <p:cNvSpPr>
+            <a:spLocks noGrp="1"/>
+          </p:cNvSpPr>
+          <p:nvPr>
+            <p:ph type="title"/>
+          </p:nvPr>
+        </p:nvSpPr>
+        <p:spPr>
+          <a:xfrm>
+            <a:off x="628650" y="0"/>
+            <a:ext cx="7886700" cy="1325563"/>
+          </a:xfrm>
+        </p:spPr>
+        <p:txBody>
+          <a:bodyPr/>
+          <a:lstStyle/>
+          <a:p>
+            <a:r>
+              <a:rPr lang="en-US" dirty="0"/>
+              <a:t>4d. compiler-hack-</a:t>
+            </a:r>
+            <a:r>
+              <a:rPr lang="en-US" dirty="0" err="1"/>
+              <a:t>ultimate.c</a:t>
+            </a:r>
+            <a:endParaRPr lang="en-US" dirty="0"/>
+          </a:p>
+        </p:txBody>
+      </p:sp>
+      <p:sp>
+        <p:nvSpPr>
+          <p:cNvPr id="4" name="Slide Number Placeholder 3"/>
+          <p:cNvSpPr>
+            <a:spLocks noGrp="1"/>
+          </p:cNvSpPr>
+          <p:nvPr>
+            <p:ph type="sldNum" sz="quarter" idx="12"/>
+          </p:nvPr>
+        </p:nvSpPr>
+        <p:spPr/>
+        <p:txBody>
+          <a:bodyPr/>
+          <a:lstStyle/>
+          <a:p>
+            <a:fld id="{9705DC4D-6496-4D9B-AA35-AB22DFE8A2F2}" type="slidenum">
+              <a:rPr lang="en-SG" smtClean="0"/>
+              <a:t>26</a:t>
+            </a:fld>
+            <a:endParaRPr lang="en-SG"/>
+          </a:p>
+        </p:txBody>
+      </p:sp>
+      <p:sp>
+        <p:nvSpPr>
+          <p:cNvPr id="5" name="Content Placeholder 2"/>
+          <p:cNvSpPr>
+            <a:spLocks noGrp="1"/>
+          </p:cNvSpPr>
+          <p:nvPr>
+            <p:ph idx="1"/>
+          </p:nvPr>
+        </p:nvSpPr>
+        <p:spPr>
+          <a:xfrm>
+            <a:off x="332014" y="1070764"/>
+            <a:ext cx="8479971" cy="5193512"/>
+          </a:xfrm>
+        </p:spPr>
+        <p:txBody>
+          <a:bodyPr>
+            <a:noAutofit/>
+          </a:bodyPr>
+          <a:lstStyle/>
+          <a:p>
+            <a:r>
+              <a:rPr lang="en-US" sz="2000" dirty="0"/>
+              <a:t>Ultimate compiler adds malicious code to itself when it sees </a:t>
+            </a:r>
+            <a:r>
+              <a:rPr lang="en-US" sz="2000" dirty="0" err="1"/>
+              <a:t>compiler.c</a:t>
+            </a:r>
+            <a:r>
+              <a:rPr lang="en-US" sz="2000" dirty="0"/>
+              <a:t>. </a:t>
+            </a:r>
+          </a:p>
+          <a:p>
+            <a:r>
+              <a:rPr lang="en-US" sz="2000" dirty="0"/>
+              <a:t>Initial compile command:</a:t>
+            </a:r>
+          </a:p>
+          <a:p>
+            <a:pPr lvl="1"/>
+            <a:r>
+              <a:rPr lang="en-US" sz="1600" dirty="0"/>
+              <a:t>../clean-</a:t>
+            </a:r>
+            <a:r>
+              <a:rPr lang="en-US" sz="1600" dirty="0" err="1"/>
+              <a:t>compiler.out</a:t>
+            </a:r>
+            <a:r>
+              <a:rPr lang="en-US" sz="1600" dirty="0"/>
+              <a:t> compiler-hack-</a:t>
+            </a:r>
+            <a:r>
+              <a:rPr lang="en-US" sz="1600" dirty="0" err="1"/>
+              <a:t>ultimate.c</a:t>
+            </a:r>
+            <a:r>
+              <a:rPr lang="en-US" sz="1600" dirty="0"/>
+              <a:t> -o compiler-hack-</a:t>
+            </a:r>
+            <a:r>
+              <a:rPr lang="en-US" sz="1600" dirty="0" err="1"/>
+              <a:t>ultimate.out</a:t>
+            </a:r>
+            <a:endParaRPr lang="en-US" sz="1600" dirty="0"/>
+          </a:p>
+          <a:p>
+            <a:pPr lvl="1"/>
+            <a:r>
+              <a:rPr lang="en-US" sz="1600" dirty="0"/>
+              <a:t>We can now discard compiler-hack-</a:t>
+            </a:r>
+            <a:r>
+              <a:rPr lang="en-US" sz="1600" dirty="0" err="1"/>
+              <a:t>ultimate.c</a:t>
+            </a:r>
+            <a:endParaRPr lang="en-US" sz="1600" dirty="0"/>
+          </a:p>
+          <a:p>
+            <a:r>
+              <a:rPr lang="en-US" sz="2000" dirty="0"/>
+              <a:t>Ultimate compiler hacking mysha256</a:t>
+            </a:r>
+          </a:p>
+          <a:p>
+            <a:pPr lvl="1"/>
+            <a:r>
+              <a:rPr lang="en-US" sz="1600" dirty="0"/>
+              <a:t>./compiler-hack-</a:t>
+            </a:r>
+            <a:r>
+              <a:rPr lang="en-US" sz="1600" dirty="0" err="1"/>
+              <a:t>ultimate.out</a:t>
+            </a:r>
+            <a:r>
+              <a:rPr lang="en-US" sz="1600" dirty="0"/>
+              <a:t> mysha256.c -o evil-mysha256.out</a:t>
+            </a:r>
+          </a:p>
+          <a:p>
+            <a:pPr lvl="1"/>
+            <a:r>
+              <a:rPr lang="en-US" sz="1600" dirty="0"/>
+              <a:t>./evil-mysha256.out compiler-hack-</a:t>
+            </a:r>
+            <a:r>
+              <a:rPr lang="en-US" sz="1600" dirty="0" err="1"/>
+              <a:t>ultimate.out</a:t>
+            </a:r>
+            <a:endParaRPr lang="en-US" sz="1600" dirty="0"/>
+          </a:p>
+          <a:p>
+            <a:pPr lvl="1"/>
+            <a:r>
+              <a:rPr lang="en-US" sz="1600" dirty="0" err="1"/>
+              <a:t>shasum</a:t>
+            </a:r>
+            <a:r>
+              <a:rPr lang="en-US" sz="1600" dirty="0"/>
+              <a:t> -a 256 compiler-hack-</a:t>
+            </a:r>
+            <a:r>
+              <a:rPr lang="en-US" sz="1600" dirty="0" err="1"/>
+              <a:t>ultimate.out</a:t>
+            </a:r>
+            <a:endParaRPr lang="en-US" sz="1600" dirty="0"/>
+          </a:p>
+          <a:p>
+            <a:r>
+              <a:rPr lang="en-US" sz="2000" dirty="0"/>
+              <a:t>Ultimate compiler hacking its clean compiler source</a:t>
+            </a:r>
+          </a:p>
+          <a:p>
+            <a:pPr lvl="1"/>
+            <a:r>
+              <a:rPr lang="en-US" sz="1600" dirty="0"/>
+              <a:t>./compiler-hack-</a:t>
+            </a:r>
+            <a:r>
+              <a:rPr lang="en-US" sz="1600" dirty="0" err="1"/>
+              <a:t>ultimate.out</a:t>
+            </a:r>
+            <a:r>
+              <a:rPr lang="en-US" sz="1600" dirty="0"/>
+              <a:t> ../</a:t>
+            </a:r>
+            <a:r>
+              <a:rPr lang="en-US" sz="1600" dirty="0" err="1"/>
+              <a:t>compiler.c</a:t>
+            </a:r>
+            <a:r>
+              <a:rPr lang="en-US" sz="1600" dirty="0"/>
+              <a:t> -o ultimate-child-</a:t>
+            </a:r>
+            <a:r>
+              <a:rPr lang="en-US" sz="1600" dirty="0" err="1"/>
+              <a:t>compiler.out</a:t>
+            </a:r>
+            <a:endParaRPr lang="en-US" sz="1600" dirty="0"/>
+          </a:p>
+          <a:p>
+            <a:pPr lvl="1"/>
+            <a:endParaRPr lang="en-US" sz="1600" dirty="0"/>
+          </a:p>
+          <a:p>
+            <a:r>
+              <a:rPr lang="en-US" sz="2000" dirty="0"/>
+              <a:t>Ultimate child compiler hacking mysha256</a:t>
+            </a:r>
+          </a:p>
+          <a:p>
+            <a:pPr lvl="1"/>
+            <a:r>
+              <a:rPr lang="en-US" sz="1600" dirty="0"/>
+              <a:t>./ultimate-child-</a:t>
+            </a:r>
+            <a:r>
+              <a:rPr lang="en-US" sz="1600" dirty="0" err="1"/>
+              <a:t>compiler.out</a:t>
+            </a:r>
+            <a:r>
+              <a:rPr lang="en-US" sz="1600" dirty="0"/>
+              <a:t> mysha256.c -o evil-mysha256.out</a:t>
+            </a:r>
+          </a:p>
+          <a:p>
+            <a:pPr lvl="1"/>
+            <a:r>
+              <a:rPr lang="en-US" sz="1600" dirty="0"/>
+              <a:t>./evil-mysha256.out ultimate-child-</a:t>
+            </a:r>
+            <a:r>
+              <a:rPr lang="en-US" sz="1600" dirty="0" err="1"/>
+              <a:t>compiler.out</a:t>
+            </a:r>
+            <a:endParaRPr lang="en-US" sz="1600" dirty="0"/>
+          </a:p>
+          <a:p>
+            <a:r>
+              <a:rPr lang="en-US" sz="1800" dirty="0"/>
+              <a:t>Ultimate child compiler still hacks compiler source code</a:t>
+            </a:r>
+          </a:p>
+          <a:p>
+            <a:pPr lvl="1"/>
+            <a:r>
+              <a:rPr lang="en-US" sz="1600" dirty="0"/>
+              <a:t>./ultimate-child-</a:t>
+            </a:r>
+            <a:r>
+              <a:rPr lang="en-US" sz="1600" dirty="0" err="1"/>
+              <a:t>compiler.out</a:t>
+            </a:r>
+            <a:r>
+              <a:rPr lang="en-US" sz="1600" dirty="0"/>
+              <a:t> ../</a:t>
+            </a:r>
+            <a:r>
+              <a:rPr lang="en-US" sz="1600" dirty="0" err="1"/>
+              <a:t>compiler.c</a:t>
+            </a:r>
+            <a:r>
+              <a:rPr lang="en-US" sz="1600" dirty="0"/>
+              <a:t> -o ultimate-child-compiler2.out</a:t>
+            </a:r>
+          </a:p>
+          <a:p>
+            <a:endParaRPr lang="en-US" sz="2000" dirty="0"/>
+          </a:p>
+          <a:p>
+            <a:endParaRPr lang="en-US" sz="2000" dirty="0"/>
+          </a:p>
+          <a:p>
+            <a:pPr lvl="1"/>
+            <a:endParaRPr lang="en-US" sz="1600" dirty="0"/>
+          </a:p>
+        </p:txBody>
+      </p:sp>
+      <p:sp>
+        <p:nvSpPr>
+          <p:cNvPr id="6" name="Rounded Rectangle 5"/>
           <p:cNvSpPr/>
           <p:nvPr/>
         </p:nvSpPr>
@@ -10932,384 +11699,10 @@
           <a:p>
             <a:pPr lvl="1"/>
             <a:r>
-              <a:rPr lang="nl-NL" dirty="0"/>
-              <a:t>7c76e4144fd9f550e2a846dbdfc7b03ee65c3eeb760b74dbbc9f5f1ae336e4dc</a:t>
-            </a:r>
-          </a:p>
-        </p:txBody>
-      </p:sp>
-    </p:spTree>
-    <p:extLst>
-      <p:ext uri="{BB962C8B-B14F-4D97-AF65-F5344CB8AC3E}">
-        <p14:creationId xmlns:p14="http://schemas.microsoft.com/office/powerpoint/2010/main" val="1364290479"/>
-      </p:ext>
-    </p:extLst>
-  </p:cSld>
-  <p:clrMapOvr>
-    <a:masterClrMapping/>
-  </p:clrMapOvr>
-</p:sld>
-</file>
-
-<file path=ppt/slides/slide26.xml><?xml version="1.0" encoding="utf-8"?>
-<p:sld xmlns:a="http://schemas.openxmlformats.org/drawingml/2006/main" xmlns:r="http://schemas.openxmlformats.org/officeDocument/2006/relationships" xmlns:p="http://schemas.openxmlformats.org/presentationml/2006/main">
-  <p:cSld>
-    <p:spTree>
-      <p:nvGrpSpPr>
-        <p:cNvPr id="1" name=""/>
-        <p:cNvGrpSpPr/>
-        <p:nvPr/>
-      </p:nvGrpSpPr>
-      <p:grpSpPr>
-        <a:xfrm>
-          <a:off x="0" y="0"/>
-          <a:ext cx="0" cy="0"/>
-          <a:chOff x="0" y="0"/>
-          <a:chExt cx="0" cy="0"/>
-        </a:xfrm>
-      </p:grpSpPr>
-      <p:sp>
-        <p:nvSpPr>
-          <p:cNvPr id="2" name="Title 1"/>
-          <p:cNvSpPr>
-            <a:spLocks noGrp="1"/>
-          </p:cNvSpPr>
-          <p:nvPr>
-            <p:ph type="title"/>
-          </p:nvPr>
-        </p:nvSpPr>
-        <p:spPr>
-          <a:xfrm>
-            <a:off x="628650" y="0"/>
-            <a:ext cx="7886700" cy="1325563"/>
-          </a:xfrm>
-        </p:spPr>
-        <p:txBody>
-          <a:bodyPr/>
-          <a:lstStyle/>
-          <a:p>
-            <a:r>
-              <a:rPr lang="en-US" dirty="0"/>
-              <a:t>4d. compiler-hack-</a:t>
-            </a:r>
-            <a:r>
-              <a:rPr lang="en-US" dirty="0" err="1"/>
-              <a:t>ultimate.c</a:t>
-            </a:r>
-            <a:endParaRPr lang="en-US" dirty="0"/>
-          </a:p>
-        </p:txBody>
-      </p:sp>
-      <p:sp>
-        <p:nvSpPr>
-          <p:cNvPr id="4" name="Slide Number Placeholder 3"/>
-          <p:cNvSpPr>
-            <a:spLocks noGrp="1"/>
-          </p:cNvSpPr>
-          <p:nvPr>
-            <p:ph type="sldNum" sz="quarter" idx="12"/>
-          </p:nvPr>
-        </p:nvSpPr>
-        <p:spPr/>
-        <p:txBody>
-          <a:bodyPr/>
-          <a:lstStyle/>
-          <a:p>
-            <a:fld id="{9705DC4D-6496-4D9B-AA35-AB22DFE8A2F2}" type="slidenum">
-              <a:rPr lang="en-SG" smtClean="0"/>
-              <a:t>26</a:t>
-            </a:fld>
-            <a:endParaRPr lang="en-SG"/>
-          </a:p>
-        </p:txBody>
-      </p:sp>
-      <p:sp>
-        <p:nvSpPr>
-          <p:cNvPr id="5" name="Content Placeholder 2"/>
-          <p:cNvSpPr>
-            <a:spLocks noGrp="1"/>
-          </p:cNvSpPr>
-          <p:nvPr>
-            <p:ph idx="1"/>
-          </p:nvPr>
-        </p:nvSpPr>
-        <p:spPr>
-          <a:xfrm>
-            <a:off x="332014" y="1070764"/>
-            <a:ext cx="8479971" cy="5193512"/>
-          </a:xfrm>
-        </p:spPr>
-        <p:txBody>
-          <a:bodyPr>
-            <a:noAutofit/>
-          </a:bodyPr>
-          <a:lstStyle/>
-          <a:p>
-            <a:r>
-              <a:rPr lang="en-US" sz="2000" dirty="0"/>
-              <a:t>Ultimate compiler adds malicious code to itself when it sees </a:t>
-            </a:r>
-            <a:r>
-              <a:rPr lang="en-US" sz="2000" dirty="0" err="1"/>
-              <a:t>compiler.c</a:t>
-            </a:r>
-            <a:r>
-              <a:rPr lang="en-US" sz="2000" dirty="0"/>
-              <a:t>. </a:t>
-            </a:r>
-          </a:p>
-          <a:p>
-            <a:r>
-              <a:rPr lang="en-US" sz="2000" dirty="0"/>
-              <a:t>Initial compile command:</a:t>
-            </a:r>
-          </a:p>
-          <a:p>
-            <a:pPr lvl="1"/>
-            <a:r>
-              <a:rPr lang="en-US" sz="1600" dirty="0"/>
-              <a:t>../clean-</a:t>
-            </a:r>
-            <a:r>
-              <a:rPr lang="en-US" sz="1600" dirty="0" err="1"/>
-              <a:t>compiler.out</a:t>
-            </a:r>
-            <a:r>
-              <a:rPr lang="en-US" sz="1600" dirty="0"/>
-              <a:t> compiler-hack-</a:t>
-            </a:r>
-            <a:r>
-              <a:rPr lang="en-US" sz="1600" dirty="0" err="1"/>
-              <a:t>ultimate.c</a:t>
-            </a:r>
-            <a:r>
-              <a:rPr lang="en-US" sz="1600" dirty="0"/>
-              <a:t> -o compiler-hack-</a:t>
-            </a:r>
-            <a:r>
-              <a:rPr lang="en-US" sz="1600" dirty="0" err="1"/>
-              <a:t>ultimate.out</a:t>
-            </a:r>
-            <a:endParaRPr lang="en-US" sz="1600" dirty="0"/>
-          </a:p>
-          <a:p>
-            <a:pPr lvl="1"/>
-            <a:r>
-              <a:rPr lang="en-US" sz="1600" dirty="0"/>
-              <a:t>We can now discard compiler-hack-</a:t>
-            </a:r>
-            <a:r>
-              <a:rPr lang="en-US" sz="1600" dirty="0" err="1"/>
-              <a:t>ultimate.c</a:t>
-            </a:r>
-            <a:endParaRPr lang="en-US" sz="1600" dirty="0"/>
-          </a:p>
-          <a:p>
-            <a:r>
-              <a:rPr lang="en-US" sz="2000" dirty="0"/>
-              <a:t>Ultimate compiler hacking mysha256</a:t>
-            </a:r>
-          </a:p>
-          <a:p>
-            <a:pPr lvl="1"/>
-            <a:r>
-              <a:rPr lang="en-US" sz="1600" dirty="0"/>
-              <a:t>./compiler-hack-</a:t>
-            </a:r>
-            <a:r>
-              <a:rPr lang="en-US" sz="1600" dirty="0" err="1"/>
-              <a:t>ultimate.out</a:t>
-            </a:r>
-            <a:r>
-              <a:rPr lang="en-US" sz="1600" dirty="0"/>
-              <a:t> mysha256.c -o evil-mysha256.out</a:t>
-            </a:r>
-          </a:p>
-          <a:p>
-            <a:pPr lvl="1"/>
-            <a:r>
-              <a:rPr lang="en-US" sz="1600" dirty="0"/>
-              <a:t>./evil-mysha256.out compiler-hack-</a:t>
-            </a:r>
-            <a:r>
-              <a:rPr lang="en-US" sz="1600" dirty="0" err="1"/>
-              <a:t>ultimate.out</a:t>
-            </a:r>
-            <a:endParaRPr lang="en-US" sz="1600" dirty="0"/>
-          </a:p>
-          <a:p>
-            <a:pPr lvl="1"/>
-            <a:r>
-              <a:rPr lang="en-US" sz="1600" dirty="0" err="1"/>
-              <a:t>shasum</a:t>
-            </a:r>
-            <a:r>
-              <a:rPr lang="en-US" sz="1600" dirty="0"/>
-              <a:t> -a 256 compiler-hack-</a:t>
-            </a:r>
-            <a:r>
-              <a:rPr lang="en-US" sz="1600" dirty="0" err="1"/>
-              <a:t>ultimate.out</a:t>
-            </a:r>
-            <a:endParaRPr lang="en-US" sz="1600" dirty="0"/>
-          </a:p>
-          <a:p>
-            <a:r>
-              <a:rPr lang="en-US" sz="2000" dirty="0"/>
-              <a:t>Ultimate compiler hacking its clean compiler source</a:t>
-            </a:r>
-          </a:p>
-          <a:p>
-            <a:pPr lvl="1"/>
-            <a:r>
-              <a:rPr lang="en-US" sz="1600" dirty="0"/>
-              <a:t>./compiler-hack-</a:t>
-            </a:r>
-            <a:r>
-              <a:rPr lang="en-US" sz="1600" dirty="0" err="1"/>
-              <a:t>ultimate.out</a:t>
-            </a:r>
-            <a:r>
-              <a:rPr lang="en-US" sz="1600" dirty="0"/>
-              <a:t> ../</a:t>
-            </a:r>
-            <a:r>
-              <a:rPr lang="en-US" sz="1600" dirty="0" err="1"/>
-              <a:t>compiler.c</a:t>
-            </a:r>
-            <a:r>
-              <a:rPr lang="en-US" sz="1600" dirty="0"/>
-              <a:t> -o ultimate-child-</a:t>
-            </a:r>
-            <a:r>
-              <a:rPr lang="en-US" sz="1600" dirty="0" err="1"/>
-              <a:t>compiler.out</a:t>
-            </a:r>
-            <a:endParaRPr lang="en-US" sz="1600" dirty="0"/>
-          </a:p>
-          <a:p>
-            <a:pPr lvl="1"/>
-            <a:endParaRPr lang="en-US" sz="1600" dirty="0"/>
-          </a:p>
-          <a:p>
-            <a:r>
-              <a:rPr lang="en-US" sz="2000" dirty="0"/>
-              <a:t>Ultimate child compiler hacking mysha256</a:t>
-            </a:r>
-          </a:p>
-          <a:p>
-            <a:pPr lvl="1"/>
-            <a:r>
-              <a:rPr lang="en-US" sz="1600" dirty="0"/>
-              <a:t>./ultimate-child-</a:t>
-            </a:r>
-            <a:r>
-              <a:rPr lang="en-US" sz="1600" dirty="0" err="1"/>
-              <a:t>compiler.out</a:t>
-            </a:r>
-            <a:r>
-              <a:rPr lang="en-US" sz="1600" dirty="0"/>
-              <a:t> mysha256.c -o evil-mysha256.out</a:t>
-            </a:r>
-          </a:p>
-          <a:p>
-            <a:pPr lvl="1"/>
-            <a:r>
-              <a:rPr lang="en-US" sz="1600" dirty="0"/>
-              <a:t>./evil-mysha256.out ultimate-child-</a:t>
-            </a:r>
-            <a:r>
-              <a:rPr lang="en-US" sz="1600" dirty="0" err="1"/>
-              <a:t>compiler.out</a:t>
-            </a:r>
-            <a:endParaRPr lang="en-US" sz="1600" dirty="0"/>
-          </a:p>
-          <a:p>
-            <a:r>
-              <a:rPr lang="en-US" sz="1800" dirty="0"/>
-              <a:t>Ultimate child compiler still hacks compiler source code</a:t>
-            </a:r>
-          </a:p>
-          <a:p>
-            <a:pPr lvl="1"/>
-            <a:r>
-              <a:rPr lang="en-US" sz="1600" dirty="0"/>
-              <a:t>./ultimate-child-</a:t>
-            </a:r>
-            <a:r>
-              <a:rPr lang="en-US" sz="1600" dirty="0" err="1"/>
-              <a:t>compiler.out</a:t>
-            </a:r>
-            <a:r>
-              <a:rPr lang="en-US" sz="1600" dirty="0"/>
-              <a:t> ../</a:t>
-            </a:r>
-            <a:r>
-              <a:rPr lang="en-US" sz="1600" dirty="0" err="1"/>
-              <a:t>compiler.c</a:t>
-            </a:r>
-            <a:r>
-              <a:rPr lang="en-US" sz="1600" dirty="0"/>
-              <a:t> -o ultimate-child-compiler2.out</a:t>
-            </a:r>
-          </a:p>
-          <a:p>
-            <a:endParaRPr lang="en-US" sz="2000" dirty="0"/>
-          </a:p>
-          <a:p>
-            <a:endParaRPr lang="en-US" sz="2000" dirty="0"/>
-          </a:p>
-          <a:p>
-            <a:pPr lvl="1"/>
-            <a:endParaRPr lang="en-US" sz="1600" dirty="0"/>
-          </a:p>
-        </p:txBody>
-      </p:sp>
-      <p:sp>
-        <p:nvSpPr>
-          <p:cNvPr id="6" name="Rounded Rectangle 5"/>
-          <p:cNvSpPr/>
-          <p:nvPr/>
-        </p:nvSpPr>
-        <p:spPr>
-          <a:xfrm>
-            <a:off x="0" y="6242051"/>
-            <a:ext cx="8030791" cy="593724"/>
-          </a:xfrm>
-          <a:prstGeom prst="roundRect">
-            <a:avLst/>
-          </a:prstGeom>
-        </p:spPr>
-        <p:style>
-          <a:lnRef idx="2">
-            <a:schemeClr val="accent6"/>
-          </a:lnRef>
-          <a:fillRef idx="1">
-            <a:schemeClr val="lt1"/>
-          </a:fillRef>
-          <a:effectRef idx="0">
-            <a:schemeClr val="accent6"/>
-          </a:effectRef>
-          <a:fontRef idx="minor">
-            <a:schemeClr val="dk1"/>
-          </a:fontRef>
-        </p:style>
-        <p:txBody>
-          <a:bodyPr rtlCol="0" anchor="ctr"/>
-          <a:lstStyle/>
-          <a:p>
-            <a:pPr lvl="1"/>
-            <a:r>
-              <a:rPr lang="nl-NL" dirty="0"/>
-              <a:t>Sha256 of clean compiler:</a:t>
-            </a:r>
-          </a:p>
-          <a:p>
-            <a:pPr lvl="1"/>
-            <a:r>
-              <a:rPr lang="nl-NL" dirty="0"/>
-              <a:t>7c76e4144fd9f550e2a846dbdfc7b03ee65c3eeb760b74dbbc9f5f1ae336e4dc</a:t>
-            </a:r>
+              <a:rPr lang="tr-TR" dirty="0"/>
+              <a:t>4ab998d76103ef5771c7ed9b2b89ddeced9f315995c901226ef655c4281be255</a:t>
+            </a:r>
+            <a:endParaRPr lang="nl-NL" dirty="0"/>
           </a:p>
         </p:txBody>
       </p:sp>
@@ -11323,6 +11716,13 @@
   <p:clrMapOvr>
     <a:masterClrMapping/>
   </p:clrMapOvr>
+  <p:timing>
+    <p:tnLst>
+      <p:par>
+        <p:cTn id="1" dur="indefinite" restart="never" nodeType="tmRoot"/>
+      </p:par>
+    </p:tnLst>
+  </p:timing>
 </p:sld>
 </file>
 
@@ -11860,6 +12260,13 @@
   <p:clrMapOvr>
     <a:masterClrMapping/>
   </p:clrMapOvr>
+  <p:timing>
+    <p:tnLst>
+      <p:par>
+        <p:cTn id="1" dur="indefinite" restart="never" nodeType="tmRoot"/>
+      </p:par>
+    </p:tnLst>
+  </p:timing>
 </p:sld>
 </file>
 
@@ -12369,8 +12776,8 @@
         </p:nvSpPr>
         <p:spPr>
           <a:xfrm>
-            <a:off x="628650" y="950414"/>
-            <a:ext cx="7886700" cy="3935095"/>
+            <a:off x="346841" y="1497724"/>
+            <a:ext cx="8797159" cy="3387785"/>
           </a:xfrm>
         </p:spPr>
         <p:txBody>
@@ -12398,7 +12805,7 @@
               <a:buNone/>
             </a:pPr>
             <a:r>
-              <a:rPr lang="en-US" sz="2000" i="1" dirty="0"/>
+              <a:rPr lang="en-US" sz="1800" i="1" dirty="0"/>
               <a:t>“To what extent should one trust a statement that a program is free of Trojan horses? </a:t>
             </a:r>
           </a:p>
@@ -12406,14 +12813,14 @@
             <a:pPr marL="0" indent="0">
               <a:buNone/>
             </a:pPr>
-            <a:endParaRPr lang="en-US" sz="2000" i="1" dirty="0"/>
+            <a:endParaRPr lang="en-US" sz="1800" i="1" dirty="0"/>
           </a:p>
           <a:p>
             <a:pPr marL="0" indent="0">
               <a:buNone/>
             </a:pPr>
             <a:r>
-              <a:rPr lang="en-US" sz="2000" i="1" dirty="0"/>
+              <a:rPr lang="en-US" sz="1800" i="1" dirty="0"/>
               <a:t>Perhaps it is more important to trust the people who wrote the software.”</a:t>
             </a:r>
           </a:p>
@@ -12464,6 +12871,13 @@
   <p:clrMapOvr>
     <a:masterClrMapping/>
   </p:clrMapOvr>
+  <p:timing>
+    <p:tnLst>
+      <p:par>
+        <p:cTn id="1" dur="indefinite" restart="never" nodeType="tmRoot"/>
+      </p:par>
+    </p:tnLst>
+  </p:timing>
 </p:sld>
 </file>
 
@@ -15320,6 +15734,13 @@
   <p:clrMapOvr>
     <a:masterClrMapping/>
   </p:clrMapOvr>
+  <p:timing>
+    <p:tnLst>
+      <p:par>
+        <p:cTn id="1" dur="indefinite" restart="never" nodeType="tmRoot"/>
+      </p:par>
+    </p:tnLst>
+  </p:timing>
 </p:sld>
 </file>
 
@@ -16566,6 +16987,13 @@
   <p:clrMapOvr>
     <a:masterClrMapping/>
   </p:clrMapOvr>
+  <p:timing>
+    <p:tnLst>
+      <p:par>
+        <p:cTn id="1" dur="indefinite" restart="never" nodeType="tmRoot"/>
+      </p:par>
+    </p:tnLst>
+  </p:timing>
 </p:sld>
 </file>
 
@@ -16706,6 +17134,13 @@
   <p:clrMapOvr>
     <a:masterClrMapping/>
   </p:clrMapOvr>
+  <p:timing>
+    <p:tnLst>
+      <p:par>
+        <p:cTn id="1" dur="indefinite" restart="never" nodeType="tmRoot"/>
+      </p:par>
+    </p:tnLst>
+  </p:timing>
 </p:sld>
 </file>
 
@@ -18694,6 +19129,13 @@
   <p:clrMapOvr>
     <a:masterClrMapping/>
   </p:clrMapOvr>
+  <p:timing>
+    <p:tnLst>
+      <p:par>
+        <p:cTn id="1" dur="indefinite" restart="never" nodeType="tmRoot"/>
+      </p:par>
+    </p:tnLst>
+  </p:timing>
 </p:sld>
 </file>
 
@@ -18823,6 +19265,13 @@
       </p:transition>
     </mc:Fallback>
   </mc:AlternateContent>
+  <p:timing>
+    <p:tnLst>
+      <p:par>
+        <p:cTn id="1" dur="indefinite" restart="never" nodeType="tmRoot"/>
+      </p:par>
+    </p:tnLst>
+  </p:timing>
 </p:sld>
 </file>
 
@@ -18865,9 +19314,10 @@
           <a:p>
             <a:pPr algn="ctr"/>
             <a:r>
-              <a:rPr lang="en-US" dirty="0"/>
-              <a:t>The End / Questions?</a:t>
-            </a:r>
+              <a:rPr lang="en-US" dirty="0" smtClean="0"/>
+              <a:t>Do you still trust your compiler?</a:t>
+            </a:r>
+            <a:endParaRPr lang="en-US" dirty="0"/>
           </a:p>
         </p:txBody>
       </p:sp>
@@ -18949,6 +19399,13 @@
   <p:clrMapOvr>
     <a:masterClrMapping/>
   </p:clrMapOvr>
+  <p:timing>
+    <p:tnLst>
+      <p:par>
+        <p:cTn id="1" dur="indefinite" restart="never" nodeType="tmRoot"/>
+      </p:par>
+    </p:tnLst>
+  </p:timing>
 </p:sld>
 </file>
 
@@ -19004,7 +19461,7 @@
         <p:spPr/>
         <p:txBody>
           <a:bodyPr>
-            <a:normAutofit fontScale="77500" lnSpcReduction="20000"/>
+            <a:normAutofit fontScale="85000" lnSpcReduction="20000"/>
           </a:bodyPr>
           <a:lstStyle/>
           <a:p>
@@ -19083,8 +19540,12 @@
           </a:p>
           <a:p>
             <a:r>
+              <a:rPr lang="en-US" dirty="0" smtClean="0"/>
+              <a:t>So </a:t>
+            </a:r>
+            <a:r>
               <a:rPr lang="en-US" dirty="0"/>
-              <a:t>Is this even a problem? So how? How deep do we go down the rabbit hole?</a:t>
+              <a:t>how? How deep do we go down the rabbit hole?</a:t>
             </a:r>
           </a:p>
           <a:p>
@@ -20378,7 +20839,7 @@
         </p:nvSpPr>
         <p:spPr>
           <a:xfrm>
-            <a:off x="628650" y="342266"/>
+            <a:off x="439464" y="412963"/>
             <a:ext cx="7886700" cy="1325563"/>
           </a:xfrm>
         </p:spPr>
@@ -20387,8 +20848,12 @@
           <a:lstStyle/>
           <a:p>
             <a:r>
+              <a:rPr lang="en-US" dirty="0" smtClean="0"/>
+              <a:t>Presentation </a:t>
+            </a:r>
+            <a:r>
               <a:rPr lang="en-US" dirty="0"/>
-              <a:t>Our objective</a:t>
+              <a:t>objective</a:t>
             </a:r>
           </a:p>
         </p:txBody>
@@ -20405,8 +20870,8 @@
         </p:nvSpPr>
         <p:spPr>
           <a:xfrm>
-            <a:off x="289560" y="2417084"/>
-            <a:ext cx="8709660" cy="2566396"/>
+            <a:off x="144780" y="2432850"/>
+            <a:ext cx="8854440" cy="2566396"/>
           </a:xfrm>
         </p:spPr>
         <p:txBody>
@@ -20424,6 +20889,10 @@
             </a:r>
           </a:p>
           <a:p>
+            <a:pPr marL="457200" indent="-457200">
+              <a:buFont typeface="+mj-lt"/>
+              <a:buAutoNum type="arabicPeriod"/>
+            </a:pPr>
             <a:r>
               <a:rPr lang="en-US" sz="2400" dirty="0"/>
               <a:t>Add malicious code to targeted compiled source </a:t>
@@ -20438,6 +20907,10 @@
             </a:r>
           </a:p>
           <a:p>
+            <a:pPr marL="457200" indent="-457200">
+              <a:buFont typeface="+mj-lt"/>
+              <a:buAutoNum type="arabicPeriod"/>
+            </a:pPr>
             <a:r>
               <a:rPr lang="en-US" sz="2400" dirty="0"/>
               <a:t>Add malicious code to compiler binary to propagate </a:t>
@@ -20449,10 +20922,29 @@
             <a:endParaRPr lang="en-US" sz="2400" dirty="0"/>
           </a:p>
           <a:p>
+            <a:pPr marL="457200" indent="-457200">
+              <a:buFont typeface="+mj-lt"/>
+              <a:buAutoNum type="arabicPeriod"/>
+            </a:pPr>
             <a:r>
               <a:rPr lang="en-US" sz="2400" dirty="0"/>
-              <a:t>Not leave a trace in compiler source</a:t>
-            </a:r>
+              <a:t>Not leave a trace in compiler </a:t>
+            </a:r>
+            <a:r>
+              <a:rPr lang="en-US" sz="2400" dirty="0" smtClean="0"/>
+              <a:t>source</a:t>
+            </a:r>
+          </a:p>
+          <a:p>
+            <a:pPr marL="457200" indent="-457200">
+              <a:buFont typeface="+mj-lt"/>
+              <a:buAutoNum type="arabicPeriod"/>
+            </a:pPr>
+            <a:r>
+              <a:rPr lang="en-US" sz="2400" dirty="0" smtClean="0"/>
+              <a:t>Subverting verification</a:t>
+            </a:r>
+            <a:endParaRPr lang="en-US" sz="2400" dirty="0"/>
           </a:p>
         </p:txBody>
       </p:sp>
@@ -20741,6 +21233,67 @@
                       </p:childTnLst>
                     </p:cTn>
                   </p:par>
+                  <p:par>
+                    <p:cTn id="23" fill="hold">
+                      <p:stCondLst>
+                        <p:cond delay="indefinite"/>
+                      </p:stCondLst>
+                      <p:childTnLst>
+                        <p:par>
+                          <p:cTn id="24" fill="hold">
+                            <p:stCondLst>
+                              <p:cond delay="0"/>
+                            </p:stCondLst>
+                            <p:childTnLst>
+                              <p:par>
+                                <p:cTn id="25" presetID="10" presetClass="entr" presetSubtype="0" fill="hold" nodeType="clickEffect">
+                                  <p:stCondLst>
+                                    <p:cond delay="0"/>
+                                  </p:stCondLst>
+                                  <p:childTnLst>
+                                    <p:set>
+                                      <p:cBhvr>
+                                        <p:cTn id="26" dur="1" fill="hold">
+                                          <p:stCondLst>
+                                            <p:cond delay="0"/>
+                                          </p:stCondLst>
+                                        </p:cTn>
+                                        <p:tgtEl>
+                                          <p:spTgt spid="3">
+                                            <p:txEl>
+                                              <p:pRg st="4" end="4"/>
+                                            </p:txEl>
+                                          </p:spTgt>
+                                        </p:tgtEl>
+                                        <p:attrNameLst>
+                                          <p:attrName>style.visibility</p:attrName>
+                                        </p:attrNameLst>
+                                      </p:cBhvr>
+                                      <p:to>
+                                        <p:strVal val="visible"/>
+                                      </p:to>
+                                    </p:set>
+                                    <p:animEffect transition="in" filter="fade">
+                                      <p:cBhvr>
+                                        <p:cTn id="27" dur="500"/>
+                                        <p:tgtEl>
+                                          <p:spTgt spid="3">
+                                            <p:txEl>
+                                              <p:pRg st="4" end="4"/>
+                                            </p:txEl>
+                                          </p:spTgt>
+                                        </p:tgtEl>
+                                      </p:cBhvr>
+                                    </p:animEffect>
+                                  </p:childTnLst>
+                                </p:cTn>
+                              </p:par>
+                            </p:childTnLst>
+                          </p:cTn>
+                        </p:par>
+                      </p:childTnLst>
+                    </p:cTn>
+                  </p:par>
                 </p:childTnLst>
               </p:cTn>
               <p:prevCondLst>
@@ -20815,7 +21368,12 @@
             <p:ph idx="1"/>
           </p:nvPr>
         </p:nvSpPr>
-        <p:spPr/>
+        <p:spPr>
+          <a:xfrm>
+            <a:off x="628650" y="1825625"/>
+            <a:ext cx="8329370" cy="4351338"/>
+          </a:xfrm>
+        </p:spPr>
         <p:txBody>
           <a:bodyPr/>
           <a:lstStyle/>
@@ -20844,8 +21402,13 @@
             </a:pPr>
             <a:r>
               <a:rPr lang="en-US" dirty="0"/>
-              <a:t>Knowledge perpetuation</a:t>
-            </a:r>
+              <a:t>Knowledge </a:t>
+            </a:r>
+            <a:r>
+              <a:rPr lang="en-US" dirty="0" smtClean="0"/>
+              <a:t>perpetuation (Compiler bootstrapping)</a:t>
+            </a:r>
+            <a:endParaRPr lang="en-US" dirty="0"/>
           </a:p>
           <a:p>
             <a:pPr marL="514350" indent="-514350">
@@ -20854,7 +21417,11 @@
             </a:pPr>
             <a:r>
               <a:rPr lang="en-US" dirty="0"/>
-              <a:t>The attack</a:t>
+              <a:t>The </a:t>
+            </a:r>
+            <a:r>
+              <a:rPr lang="en-US" dirty="0" smtClean="0"/>
+              <a:t>attack</a:t>
             </a:r>
           </a:p>
           <a:p>
@@ -20863,25 +21430,10 @@
               <a:buAutoNum type="arabicPeriod"/>
             </a:pPr>
             <a:r>
-              <a:rPr lang="en-US" dirty="0"/>
-              <a:t>Subverting verification*</a:t>
-            </a:r>
-          </a:p>
-          <a:p>
-            <a:pPr marL="514350" indent="-514350">
-              <a:buFont typeface="+mj-lt"/>
-              <a:buAutoNum type="arabicPeriod"/>
-            </a:pPr>
+              <a:rPr lang="en-US" dirty="0" smtClean="0"/>
+              <a:t>Conclusion</a:t>
+            </a:r>
             <a:endParaRPr lang="en-US" dirty="0"/>
-          </a:p>
-          <a:p>
-            <a:pPr marL="0" indent="0">
-              <a:buNone/>
-            </a:pPr>
-            <a:r>
-              <a:rPr lang="en-US" dirty="0"/>
-              <a:t>Finally: The conclusion</a:t>
-            </a:r>
           </a:p>
         </p:txBody>
       </p:sp>
@@ -20905,35 +21457,6 @@
               <a:t>7</a:t>
             </a:fld>
             <a:endParaRPr lang="en-SG"/>
-          </a:p>
-        </p:txBody>
-      </p:sp>
-      <p:sp>
-        <p:nvSpPr>
-          <p:cNvPr id="5" name="TextBox 4"/>
-          <p:cNvSpPr txBox="1"/>
-          <p:nvPr/>
-        </p:nvSpPr>
-        <p:spPr>
-          <a:xfrm>
-            <a:off x="628650" y="5987019"/>
-            <a:ext cx="2175596" cy="369332"/>
-          </a:xfrm>
-          <a:prstGeom prst="rect">
-            <a:avLst/>
-          </a:prstGeom>
-          <a:noFill/>
-        </p:spPr>
-        <p:txBody>
-          <a:bodyPr wrap="none" rtlCol="0">
-            <a:spAutoFit/>
-          </a:bodyPr>
-          <a:lstStyle/>
-          <a:p>
-            <a:r>
-              <a:rPr lang="en-SG" dirty="0"/>
-              <a:t>*My custom addition</a:t>
-            </a:r>
           </a:p>
         </p:txBody>
       </p:sp>
@@ -21045,8 +21568,13 @@
             </a:pPr>
             <a:r>
               <a:rPr lang="en-US" dirty="0"/>
-              <a:t>A program can output extra text not relevant to printing itself.</a:t>
-            </a:r>
+              <a:t>A program can output extra text not relevant </a:t>
+            </a:r>
+            <a:r>
+              <a:rPr lang="en-US" dirty="0" smtClean="0"/>
+              <a:t>to logic (comments)</a:t>
+            </a:r>
+            <a:endParaRPr lang="en-US" dirty="0"/>
           </a:p>
         </p:txBody>
       </p:sp>
@@ -21419,14 +21947,14 @@
                 <a:gridCol w="3048000">
                   <a:extLst>
                     <a:ext uri="{9D8B030D-6E8A-4147-A177-3AD203B41FA5}">
-                      <a16:colId xmlns:a16="http://schemas.microsoft.com/office/drawing/2014/main" val="20000"/>
+                      <a16:colId xmlns="" xmlns:a16="http://schemas.microsoft.com/office/drawing/2014/main" val="20000"/>
                     </a:ext>
                   </a:extLst>
                 </a:gridCol>
                 <a:gridCol w="3048000">
                   <a:extLst>
                     <a:ext uri="{9D8B030D-6E8A-4147-A177-3AD203B41FA5}">
-                      <a16:colId xmlns:a16="http://schemas.microsoft.com/office/drawing/2014/main" val="20001"/>
+                      <a16:colId xmlns="" xmlns:a16="http://schemas.microsoft.com/office/drawing/2014/main" val="20001"/>
                     </a:ext>
                   </a:extLst>
                 </a:gridCol>
@@ -21460,7 +21988,7 @@
                 </a:tc>
                 <a:extLst>
                   <a:ext uri="{0D108BD9-81ED-4DB2-BD59-A6C34878D82A}">
-                    <a16:rowId xmlns:a16="http://schemas.microsoft.com/office/drawing/2014/main" val="10000"/>
+                    <a16:rowId xmlns="" xmlns:a16="http://schemas.microsoft.com/office/drawing/2014/main" val="10000"/>
                   </a:ext>
                 </a:extLst>
               </a:tr>
@@ -21527,7 +22055,7 @@
                 </a:tc>
                 <a:extLst>
                   <a:ext uri="{0D108BD9-81ED-4DB2-BD59-A6C34878D82A}">
-                    <a16:rowId xmlns:a16="http://schemas.microsoft.com/office/drawing/2014/main" val="10001"/>
+                    <a16:rowId xmlns="" xmlns:a16="http://schemas.microsoft.com/office/drawing/2014/main" val="10001"/>
                   </a:ext>
                 </a:extLst>
               </a:tr>
@@ -21565,7 +22093,7 @@
                 </a:tc>
                 <a:extLst>
                   <a:ext uri="{0D108BD9-81ED-4DB2-BD59-A6C34878D82A}">
-                    <a16:rowId xmlns:a16="http://schemas.microsoft.com/office/drawing/2014/main" val="10002"/>
+                    <a16:rowId xmlns="" xmlns:a16="http://schemas.microsoft.com/office/drawing/2014/main" val="10002"/>
                   </a:ext>
                 </a:extLst>
               </a:tr>
@@ -21636,7 +22164,7 @@
                 </a:tc>
                 <a:extLst>
                   <a:ext uri="{0D108BD9-81ED-4DB2-BD59-A6C34878D82A}">
-                    <a16:rowId xmlns:a16="http://schemas.microsoft.com/office/drawing/2014/main" val="10003"/>
+                    <a16:rowId xmlns="" xmlns:a16="http://schemas.microsoft.com/office/drawing/2014/main" val="10003"/>
                   </a:ext>
                 </a:extLst>
               </a:tr>
@@ -21691,7 +22219,7 @@
                 </a:tc>
                 <a:extLst>
                   <a:ext uri="{0D108BD9-81ED-4DB2-BD59-A6C34878D82A}">
-                    <a16:rowId xmlns:a16="http://schemas.microsoft.com/office/drawing/2014/main" val="10004"/>
+                    <a16:rowId xmlns="" xmlns:a16="http://schemas.microsoft.com/office/drawing/2014/main" val="10004"/>
                   </a:ext>
                 </a:extLst>
               </a:tr>
@@ -21754,7 +22282,7 @@
                 </a:tc>
                 <a:extLst>
                   <a:ext uri="{0D108BD9-81ED-4DB2-BD59-A6C34878D82A}">
-                    <a16:rowId xmlns:a16="http://schemas.microsoft.com/office/drawing/2014/main" val="10005"/>
+                    <a16:rowId xmlns="" xmlns:a16="http://schemas.microsoft.com/office/drawing/2014/main" val="10005"/>
                   </a:ext>
                 </a:extLst>
               </a:tr>
@@ -21831,6 +22359,13 @@
   <p:clrMapOvr>
     <a:masterClrMapping/>
   </p:clrMapOvr>
+  <p:timing>
+    <p:tnLst>
+      <p:par>
+        <p:cTn id="1" dur="indefinite" restart="never" nodeType="tmRoot"/>
+      </p:par>
+    </p:tnLst>
+  </p:timing>
 </p:sld>
 </file>
 

</xml_diff>

<commit_message>
adjust text to refer to compiler bootstrapping instead
</commit_message>
<xml_diff>
--- a/reflections-on-trusting-trust-slides.pptx
+++ b/reflections-on-trusting-trust-slides.pptx
@@ -238,7 +238,7 @@
           <a:p>
             <a:fld id="{DBB36151-A010-D04C-8956-928746249808}" type="datetimeFigureOut">
               <a:rPr lang="en-US" smtClean="0"/>
-              <a:t>3/3/17</a:t>
+              <a:t>3/8/17</a:t>
             </a:fld>
             <a:endParaRPr lang="en-US"/>
           </a:p>
@@ -403,7 +403,7 @@
           <a:p>
             <a:fld id="{A4C7C88C-CDFE-4350-B2C5-3C6CAEFDB07C}" type="datetimeFigureOut">
               <a:rPr lang="en-SG" smtClean="0"/>
-              <a:t>3/3/17</a:t>
+              <a:t>8/3/17</a:t>
             </a:fld>
             <a:endParaRPr lang="en-SG"/>
           </a:p>
@@ -970,7 +970,7 @@
           <a:p>
             <a:fld id="{422F67E2-38E7-4A1D-97B7-1A3D76F52D34}" type="datetime1">
               <a:rPr lang="en-SG" smtClean="0"/>
-              <a:t>3/3/17</a:t>
+              <a:t>8/3/17</a:t>
             </a:fld>
             <a:endParaRPr lang="en-SG"/>
           </a:p>
@@ -1140,7 +1140,7 @@
           <a:p>
             <a:fld id="{571D26BE-CF29-49E8-90A9-693FA176DA2E}" type="datetime1">
               <a:rPr lang="en-SG" smtClean="0"/>
-              <a:t>3/3/17</a:t>
+              <a:t>8/3/17</a:t>
             </a:fld>
             <a:endParaRPr lang="en-SG"/>
           </a:p>
@@ -1320,7 +1320,7 @@
           <a:p>
             <a:fld id="{9465F57D-487B-4FA9-9804-4E6B1445D87E}" type="datetime1">
               <a:rPr lang="en-SG" smtClean="0"/>
-              <a:t>3/3/17</a:t>
+              <a:t>8/3/17</a:t>
             </a:fld>
             <a:endParaRPr lang="en-SG"/>
           </a:p>
@@ -1490,7 +1490,7 @@
           <a:p>
             <a:fld id="{FF100F33-09D9-4424-9CFF-3583AE8E001C}" type="datetime1">
               <a:rPr lang="en-SG" smtClean="0"/>
-              <a:t>3/3/17</a:t>
+              <a:t>8/3/17</a:t>
             </a:fld>
             <a:endParaRPr lang="en-SG"/>
           </a:p>
@@ -1734,7 +1734,7 @@
           <a:p>
             <a:fld id="{FEDF4C57-AE9B-4009-AE25-E54332066983}" type="datetime1">
               <a:rPr lang="en-SG" smtClean="0"/>
-              <a:t>3/3/17</a:t>
+              <a:t>8/3/17</a:t>
             </a:fld>
             <a:endParaRPr lang="en-SG"/>
           </a:p>
@@ -1966,7 +1966,7 @@
           <a:p>
             <a:fld id="{8804DBDF-77D8-4526-82F0-2FD9258F6F4E}" type="datetime1">
               <a:rPr lang="en-SG" smtClean="0"/>
-              <a:t>3/3/17</a:t>
+              <a:t>8/3/17</a:t>
             </a:fld>
             <a:endParaRPr lang="en-SG"/>
           </a:p>
@@ -2333,7 +2333,7 @@
           <a:p>
             <a:fld id="{2EDDACF3-1137-43EC-8B9B-FFC39405A05F}" type="datetime1">
               <a:rPr lang="en-SG" smtClean="0"/>
-              <a:t>3/3/17</a:t>
+              <a:t>8/3/17</a:t>
             </a:fld>
             <a:endParaRPr lang="en-SG"/>
           </a:p>
@@ -2451,7 +2451,7 @@
           <a:p>
             <a:fld id="{7EA35B8A-1AE7-4E07-AA62-B18CC233816A}" type="datetime1">
               <a:rPr lang="en-SG" smtClean="0"/>
-              <a:t>3/3/17</a:t>
+              <a:t>8/3/17</a:t>
             </a:fld>
             <a:endParaRPr lang="en-SG"/>
           </a:p>
@@ -2546,7 +2546,7 @@
           <a:p>
             <a:fld id="{3E5DB0B1-4D46-4B8D-87D9-ED3A0D6268D9}" type="datetime1">
               <a:rPr lang="en-SG" smtClean="0"/>
-              <a:t>3/3/17</a:t>
+              <a:t>8/3/17</a:t>
             </a:fld>
             <a:endParaRPr lang="en-SG"/>
           </a:p>
@@ -2823,7 +2823,7 @@
           <a:p>
             <a:fld id="{B5FAF827-52F0-4265-95B3-9B7BE33238A1}" type="datetime1">
               <a:rPr lang="en-SG" smtClean="0"/>
-              <a:t>3/3/17</a:t>
+              <a:t>8/3/17</a:t>
             </a:fld>
             <a:endParaRPr lang="en-SG"/>
           </a:p>
@@ -3080,7 +3080,7 @@
           <a:p>
             <a:fld id="{FB910920-7330-4500-8EED-E7F9B59504DB}" type="datetime1">
               <a:rPr lang="en-SG" smtClean="0"/>
-              <a:t>3/3/17</a:t>
+              <a:t>8/3/17</a:t>
             </a:fld>
             <a:endParaRPr lang="en-SG"/>
           </a:p>
@@ -3293,7 +3293,7 @@
           <a:p>
             <a:fld id="{049282E9-B576-43F6-B614-0FB8874DC925}" type="datetime1">
               <a:rPr lang="en-SG" smtClean="0"/>
-              <a:t>3/3/17</a:t>
+              <a:t>8/3/17</a:t>
             </a:fld>
             <a:endParaRPr lang="en-SG"/>
           </a:p>
@@ -4095,16 +4095,9 @@
             <a:pPr lvl="1"/>
             <a:r>
               <a:rPr lang="en-US" dirty="0" smtClean="0"/>
-              <a:t>Child compilers can subsequently </a:t>
-            </a:r>
-            <a:r>
-              <a:rPr lang="en-US" dirty="0" err="1" smtClean="0"/>
-              <a:t>recognise</a:t>
-            </a:r>
-            <a:r>
-              <a:rPr lang="en-US" dirty="0" smtClean="0"/>
-              <a:t> it</a:t>
-            </a:r>
+              <a:t>Compiler own source code can use the new data type</a:t>
+            </a:r>
+            <a:endParaRPr lang="en-US" dirty="0" smtClean="0"/>
           </a:p>
           <a:p>
             <a:pPr lvl="1"/>
@@ -4459,14 +4452,14 @@
                 <a:gridCol w="3744686">
                   <a:extLst>
                     <a:ext uri="{9D8B030D-6E8A-4147-A177-3AD203B41FA5}">
-                      <a16:colId xmlns="" xmlns:a16="http://schemas.microsoft.com/office/drawing/2014/main" val="20000"/>
+                      <a16:colId xmlns:a16="http://schemas.microsoft.com/office/drawing/2014/main" xmlns="" val="20000"/>
                     </a:ext>
                   </a:extLst>
                 </a:gridCol>
                 <a:gridCol w="3744686">
                   <a:extLst>
                     <a:ext uri="{9D8B030D-6E8A-4147-A177-3AD203B41FA5}">
-                      <a16:colId xmlns="" xmlns:a16="http://schemas.microsoft.com/office/drawing/2014/main" val="20001"/>
+                      <a16:colId xmlns:a16="http://schemas.microsoft.com/office/drawing/2014/main" xmlns="" val="20001"/>
                     </a:ext>
                   </a:extLst>
                 </a:gridCol>
@@ -4500,7 +4493,7 @@
                 </a:tc>
                 <a:extLst>
                   <a:ext uri="{0D108BD9-81ED-4DB2-BD59-A6C34878D82A}">
-                    <a16:rowId xmlns="" xmlns:a16="http://schemas.microsoft.com/office/drawing/2014/main" val="10000"/>
+                    <a16:rowId xmlns:a16="http://schemas.microsoft.com/office/drawing/2014/main" xmlns="" val="10000"/>
                   </a:ext>
                 </a:extLst>
               </a:tr>
@@ -4538,7 +4531,7 @@
                 </a:tc>
                 <a:extLst>
                   <a:ext uri="{0D108BD9-81ED-4DB2-BD59-A6C34878D82A}">
-                    <a16:rowId xmlns="" xmlns:a16="http://schemas.microsoft.com/office/drawing/2014/main" val="10001"/>
+                    <a16:rowId xmlns:a16="http://schemas.microsoft.com/office/drawing/2014/main" xmlns="" val="10001"/>
                   </a:ext>
                 </a:extLst>
               </a:tr>
@@ -4593,7 +4586,7 @@
                 </a:tc>
                 <a:extLst>
                   <a:ext uri="{0D108BD9-81ED-4DB2-BD59-A6C34878D82A}">
-                    <a16:rowId xmlns="" xmlns:a16="http://schemas.microsoft.com/office/drawing/2014/main" val="10002"/>
+                    <a16:rowId xmlns:a16="http://schemas.microsoft.com/office/drawing/2014/main" xmlns="" val="10002"/>
                   </a:ext>
                 </a:extLst>
               </a:tr>
@@ -4631,7 +4624,7 @@
                 </a:tc>
                 <a:extLst>
                   <a:ext uri="{0D108BD9-81ED-4DB2-BD59-A6C34878D82A}">
-                    <a16:rowId xmlns="" xmlns:a16="http://schemas.microsoft.com/office/drawing/2014/main" val="10003"/>
+                    <a16:rowId xmlns:a16="http://schemas.microsoft.com/office/drawing/2014/main" xmlns="" val="10003"/>
                   </a:ext>
                 </a:extLst>
               </a:tr>
@@ -4690,7 +4683,7 @@
                 </a:tc>
                 <a:extLst>
                   <a:ext uri="{0D108BD9-81ED-4DB2-BD59-A6C34878D82A}">
-                    <a16:rowId xmlns="" xmlns:a16="http://schemas.microsoft.com/office/drawing/2014/main" val="10004"/>
+                    <a16:rowId xmlns:a16="http://schemas.microsoft.com/office/drawing/2014/main" xmlns="" val="10004"/>
                   </a:ext>
                 </a:extLst>
               </a:tr>
@@ -4754,7 +4747,7 @@
                 </a:tc>
                 <a:extLst>
                   <a:ext uri="{0D108BD9-81ED-4DB2-BD59-A6C34878D82A}">
-                    <a16:rowId xmlns="" xmlns:a16="http://schemas.microsoft.com/office/drawing/2014/main" val="10005"/>
+                    <a16:rowId xmlns:a16="http://schemas.microsoft.com/office/drawing/2014/main" xmlns="" val="10005"/>
                   </a:ext>
                 </a:extLst>
               </a:tr>
@@ -4930,14 +4923,14 @@
                 <a:gridCol w="4080222">
                   <a:extLst>
                     <a:ext uri="{9D8B030D-6E8A-4147-A177-3AD203B41FA5}">
-                      <a16:colId xmlns="" xmlns:a16="http://schemas.microsoft.com/office/drawing/2014/main" val="20000"/>
+                      <a16:colId xmlns:a16="http://schemas.microsoft.com/office/drawing/2014/main" xmlns="" val="20000"/>
                     </a:ext>
                   </a:extLst>
                 </a:gridCol>
                 <a:gridCol w="4910098">
                   <a:extLst>
                     <a:ext uri="{9D8B030D-6E8A-4147-A177-3AD203B41FA5}">
-                      <a16:colId xmlns="" xmlns:a16="http://schemas.microsoft.com/office/drawing/2014/main" val="20001"/>
+                      <a16:colId xmlns:a16="http://schemas.microsoft.com/office/drawing/2014/main" xmlns="" val="20001"/>
                     </a:ext>
                   </a:extLst>
                 </a:gridCol>
@@ -4971,7 +4964,7 @@
                 </a:tc>
                 <a:extLst>
                   <a:ext uri="{0D108BD9-81ED-4DB2-BD59-A6C34878D82A}">
-                    <a16:rowId xmlns="" xmlns:a16="http://schemas.microsoft.com/office/drawing/2014/main" val="10000"/>
+                    <a16:rowId xmlns:a16="http://schemas.microsoft.com/office/drawing/2014/main" xmlns="" val="10000"/>
                   </a:ext>
                 </a:extLst>
               </a:tr>
@@ -5018,7 +5011,7 @@
                 </a:tc>
                 <a:extLst>
                   <a:ext uri="{0D108BD9-81ED-4DB2-BD59-A6C34878D82A}">
-                    <a16:rowId xmlns="" xmlns:a16="http://schemas.microsoft.com/office/drawing/2014/main" val="10001"/>
+                    <a16:rowId xmlns:a16="http://schemas.microsoft.com/office/drawing/2014/main" xmlns="" val="10001"/>
                   </a:ext>
                 </a:extLst>
               </a:tr>
@@ -5103,7 +5096,7 @@
                 </a:tc>
                 <a:extLst>
                   <a:ext uri="{0D108BD9-81ED-4DB2-BD59-A6C34878D82A}">
-                    <a16:rowId xmlns="" xmlns:a16="http://schemas.microsoft.com/office/drawing/2014/main" val="10002"/>
+                    <a16:rowId xmlns:a16="http://schemas.microsoft.com/office/drawing/2014/main" xmlns="" val="10002"/>
                   </a:ext>
                 </a:extLst>
               </a:tr>
@@ -5146,7 +5139,7 @@
                 </a:tc>
                 <a:extLst>
                   <a:ext uri="{0D108BD9-81ED-4DB2-BD59-A6C34878D82A}">
-                    <a16:rowId xmlns="" xmlns:a16="http://schemas.microsoft.com/office/drawing/2014/main" val="10003"/>
+                    <a16:rowId xmlns:a16="http://schemas.microsoft.com/office/drawing/2014/main" xmlns="" val="10003"/>
                   </a:ext>
                 </a:extLst>
               </a:tr>
@@ -5208,7 +5201,7 @@
                 </a:tc>
                 <a:extLst>
                   <a:ext uri="{0D108BD9-81ED-4DB2-BD59-A6C34878D82A}">
-                    <a16:rowId xmlns="" xmlns:a16="http://schemas.microsoft.com/office/drawing/2014/main" val="10004"/>
+                    <a16:rowId xmlns:a16="http://schemas.microsoft.com/office/drawing/2014/main" xmlns="" val="10004"/>
                   </a:ext>
                 </a:extLst>
               </a:tr>
@@ -5271,7 +5264,7 @@
                 </a:tc>
                 <a:extLst>
                   <a:ext uri="{0D108BD9-81ED-4DB2-BD59-A6C34878D82A}">
-                    <a16:rowId xmlns="" xmlns:a16="http://schemas.microsoft.com/office/drawing/2014/main" val="10005"/>
+                    <a16:rowId xmlns:a16="http://schemas.microsoft.com/office/drawing/2014/main" xmlns="" val="10005"/>
                   </a:ext>
                 </a:extLst>
               </a:tr>
@@ -5317,7 +5310,7 @@
                 </a:tc>
                 <a:extLst>
                   <a:ext uri="{0D108BD9-81ED-4DB2-BD59-A6C34878D82A}">
-                    <a16:rowId xmlns="" xmlns:a16="http://schemas.microsoft.com/office/drawing/2014/main" val="10006"/>
+                    <a16:rowId xmlns:a16="http://schemas.microsoft.com/office/drawing/2014/main" xmlns="" val="10006"/>
                   </a:ext>
                 </a:extLst>
               </a:tr>
@@ -5652,9 +5645,10 @@
               <a:buAutoNum type="arabicPeriod"/>
             </a:pPr>
             <a:r>
-              <a:rPr lang="en-US" dirty="0"/>
-              <a:t>A compiler can propagate knowledge to the next generation of itself. </a:t>
-            </a:r>
+              <a:rPr lang="en-US" dirty="0" smtClean="0"/>
+              <a:t>Compiler bootstrapping</a:t>
+            </a:r>
+            <a:endParaRPr lang="en-US" dirty="0"/>
           </a:p>
         </p:txBody>
       </p:sp>
@@ -21470,6 +21464,13 @@
   <p:clrMapOvr>
     <a:masterClrMapping/>
   </p:clrMapOvr>
+  <p:timing>
+    <p:tnLst>
+      <p:par>
+        <p:cTn id="1" dur="indefinite" restart="never" nodeType="tmRoot"/>
+      </p:par>
+    </p:tnLst>
+  </p:timing>
 </p:sld>
 </file>
 
@@ -21947,14 +21948,14 @@
                 <a:gridCol w="3048000">
                   <a:extLst>
                     <a:ext uri="{9D8B030D-6E8A-4147-A177-3AD203B41FA5}">
-                      <a16:colId xmlns="" xmlns:a16="http://schemas.microsoft.com/office/drawing/2014/main" val="20000"/>
+                      <a16:colId xmlns:a16="http://schemas.microsoft.com/office/drawing/2014/main" xmlns="" val="20000"/>
                     </a:ext>
                   </a:extLst>
                 </a:gridCol>
                 <a:gridCol w="3048000">
                   <a:extLst>
                     <a:ext uri="{9D8B030D-6E8A-4147-A177-3AD203B41FA5}">
-                      <a16:colId xmlns="" xmlns:a16="http://schemas.microsoft.com/office/drawing/2014/main" val="20001"/>
+                      <a16:colId xmlns:a16="http://schemas.microsoft.com/office/drawing/2014/main" xmlns="" val="20001"/>
                     </a:ext>
                   </a:extLst>
                 </a:gridCol>
@@ -21988,7 +21989,7 @@
                 </a:tc>
                 <a:extLst>
                   <a:ext uri="{0D108BD9-81ED-4DB2-BD59-A6C34878D82A}">
-                    <a16:rowId xmlns="" xmlns:a16="http://schemas.microsoft.com/office/drawing/2014/main" val="10000"/>
+                    <a16:rowId xmlns:a16="http://schemas.microsoft.com/office/drawing/2014/main" xmlns="" val="10000"/>
                   </a:ext>
                 </a:extLst>
               </a:tr>
@@ -22055,7 +22056,7 @@
                 </a:tc>
                 <a:extLst>
                   <a:ext uri="{0D108BD9-81ED-4DB2-BD59-A6C34878D82A}">
-                    <a16:rowId xmlns="" xmlns:a16="http://schemas.microsoft.com/office/drawing/2014/main" val="10001"/>
+                    <a16:rowId xmlns:a16="http://schemas.microsoft.com/office/drawing/2014/main" xmlns="" val="10001"/>
                   </a:ext>
                 </a:extLst>
               </a:tr>
@@ -22093,7 +22094,7 @@
                 </a:tc>
                 <a:extLst>
                   <a:ext uri="{0D108BD9-81ED-4DB2-BD59-A6C34878D82A}">
-                    <a16:rowId xmlns="" xmlns:a16="http://schemas.microsoft.com/office/drawing/2014/main" val="10002"/>
+                    <a16:rowId xmlns:a16="http://schemas.microsoft.com/office/drawing/2014/main" xmlns="" val="10002"/>
                   </a:ext>
                 </a:extLst>
               </a:tr>
@@ -22164,7 +22165,7 @@
                 </a:tc>
                 <a:extLst>
                   <a:ext uri="{0D108BD9-81ED-4DB2-BD59-A6C34878D82A}">
-                    <a16:rowId xmlns="" xmlns:a16="http://schemas.microsoft.com/office/drawing/2014/main" val="10003"/>
+                    <a16:rowId xmlns:a16="http://schemas.microsoft.com/office/drawing/2014/main" xmlns="" val="10003"/>
                   </a:ext>
                 </a:extLst>
               </a:tr>
@@ -22219,7 +22220,7 @@
                 </a:tc>
                 <a:extLst>
                   <a:ext uri="{0D108BD9-81ED-4DB2-BD59-A6C34878D82A}">
-                    <a16:rowId xmlns="" xmlns:a16="http://schemas.microsoft.com/office/drawing/2014/main" val="10004"/>
+                    <a16:rowId xmlns:a16="http://schemas.microsoft.com/office/drawing/2014/main" xmlns="" val="10004"/>
                   </a:ext>
                 </a:extLst>
               </a:tr>
@@ -22282,7 +22283,7 @@
                 </a:tc>
                 <a:extLst>
                   <a:ext uri="{0D108BD9-81ED-4DB2-BD59-A6C34878D82A}">
-                    <a16:rowId xmlns="" xmlns:a16="http://schemas.microsoft.com/office/drawing/2014/main" val="10005"/>
+                    <a16:rowId xmlns:a16="http://schemas.microsoft.com/office/drawing/2014/main" xmlns="" val="10005"/>
                   </a:ext>
                 </a:extLst>
               </a:tr>

</xml_diff>